<commit_message>
docs: ✏️ added diagram - hexagonal arch
</commit_message>
<xml_diff>
--- a/docs/diagrams.pptx
+++ b/docs/diagrams.pptx
@@ -5,7 +5,8 @@
     <p:sldMasterId id="2147483648" r:id="rId1"/>
   </p:sldMasterIdLst>
   <p:sldIdLst>
-    <p:sldId id="256" r:id="rId2"/>
+    <p:sldId id="257" r:id="rId2"/>
+    <p:sldId id="256" r:id="rId3"/>
   </p:sldIdLst>
   <p:sldSz cx="12192000" cy="6858000"/>
   <p:notesSz cx="6858000" cy="9144000"/>
@@ -106,7 +107,7 @@
   </p:defaultTextStyle>
   <p:extLst>
     <p:ext uri="{EFAFB233-063F-42B5-8137-9DF3F51BA10A}">
-      <p15:sldGuideLst xmlns="" xmlns:p15="http://schemas.microsoft.com/office/powerpoint/2012/main"/>
+      <p15:sldGuideLst xmlns:p15="http://schemas.microsoft.com/office/powerpoint/2012/main" xmlns=""/>
     </p:ext>
   </p:extLst>
 </p:presentation>
@@ -244,7 +245,7 @@
             <a:fld id="{388BEFF6-CA1E-4F2C-AB17-C8AC986E5615}" type="datetimeFigureOut">
               <a:rPr lang="en-US" smtClean="0"/>
               <a:pPr/>
-              <a:t>8/10/2024</a:t>
+              <a:t>8/12/2024</a:t>
             </a:fld>
             <a:endParaRPr lang="en-US" dirty="0"/>
           </a:p>
@@ -296,7 +297,7 @@
     </p:spTree>
     <p:extLst>
       <p:ext uri="{BB962C8B-B14F-4D97-AF65-F5344CB8AC3E}">
-        <p14:creationId xmlns="" xmlns:p14="http://schemas.microsoft.com/office/powerpoint/2010/main" val="2436347131"/>
+        <p14:creationId xmlns:p14="http://schemas.microsoft.com/office/powerpoint/2010/main" xmlns="" val="2436347131"/>
       </p:ext>
     </p:extLst>
   </p:cSld>
@@ -416,7 +417,7 @@
             <a:fld id="{388BEFF6-CA1E-4F2C-AB17-C8AC986E5615}" type="datetimeFigureOut">
               <a:rPr lang="en-US" smtClean="0"/>
               <a:pPr/>
-              <a:t>8/10/2024</a:t>
+              <a:t>8/12/2024</a:t>
             </a:fld>
             <a:endParaRPr lang="en-US" dirty="0"/>
           </a:p>
@@ -468,7 +469,7 @@
     </p:spTree>
     <p:extLst>
       <p:ext uri="{BB962C8B-B14F-4D97-AF65-F5344CB8AC3E}">
-        <p14:creationId xmlns="" xmlns:p14="http://schemas.microsoft.com/office/powerpoint/2010/main" val="488834116"/>
+        <p14:creationId xmlns:p14="http://schemas.microsoft.com/office/powerpoint/2010/main" xmlns="" val="488834116"/>
       </p:ext>
     </p:extLst>
   </p:cSld>
@@ -598,7 +599,7 @@
             <a:fld id="{388BEFF6-CA1E-4F2C-AB17-C8AC986E5615}" type="datetimeFigureOut">
               <a:rPr lang="en-US" smtClean="0"/>
               <a:pPr/>
-              <a:t>8/10/2024</a:t>
+              <a:t>8/12/2024</a:t>
             </a:fld>
             <a:endParaRPr lang="en-US" dirty="0"/>
           </a:p>
@@ -650,7 +651,7 @@
     </p:spTree>
     <p:extLst>
       <p:ext uri="{BB962C8B-B14F-4D97-AF65-F5344CB8AC3E}">
-        <p14:creationId xmlns="" xmlns:p14="http://schemas.microsoft.com/office/powerpoint/2010/main" val="3817113929"/>
+        <p14:creationId xmlns:p14="http://schemas.microsoft.com/office/powerpoint/2010/main" xmlns="" val="3817113929"/>
       </p:ext>
     </p:extLst>
   </p:cSld>
@@ -770,7 +771,7 @@
             <a:fld id="{388BEFF6-CA1E-4F2C-AB17-C8AC986E5615}" type="datetimeFigureOut">
               <a:rPr lang="en-US" smtClean="0"/>
               <a:pPr/>
-              <a:t>8/10/2024</a:t>
+              <a:t>8/12/2024</a:t>
             </a:fld>
             <a:endParaRPr lang="en-US" dirty="0"/>
           </a:p>
@@ -822,7 +823,7 @@
     </p:spTree>
     <p:extLst>
       <p:ext uri="{BB962C8B-B14F-4D97-AF65-F5344CB8AC3E}">
-        <p14:creationId xmlns="" xmlns:p14="http://schemas.microsoft.com/office/powerpoint/2010/main" val="2511372462"/>
+        <p14:creationId xmlns:p14="http://schemas.microsoft.com/office/powerpoint/2010/main" xmlns="" val="2511372462"/>
       </p:ext>
     </p:extLst>
   </p:cSld>
@@ -1018,7 +1019,7 @@
             <a:fld id="{388BEFF6-CA1E-4F2C-AB17-C8AC986E5615}" type="datetimeFigureOut">
               <a:rPr lang="en-US" smtClean="0"/>
               <a:pPr/>
-              <a:t>8/10/2024</a:t>
+              <a:t>8/12/2024</a:t>
             </a:fld>
             <a:endParaRPr lang="en-US" dirty="0"/>
           </a:p>
@@ -1070,7 +1071,7 @@
     </p:spTree>
     <p:extLst>
       <p:ext uri="{BB962C8B-B14F-4D97-AF65-F5344CB8AC3E}">
-        <p14:creationId xmlns="" xmlns:p14="http://schemas.microsoft.com/office/powerpoint/2010/main" val="890383841"/>
+        <p14:creationId xmlns:p14="http://schemas.microsoft.com/office/powerpoint/2010/main" xmlns="" val="890383841"/>
       </p:ext>
     </p:extLst>
   </p:cSld>
@@ -1252,7 +1253,7 @@
             <a:fld id="{388BEFF6-CA1E-4F2C-AB17-C8AC986E5615}" type="datetimeFigureOut">
               <a:rPr lang="en-US" smtClean="0"/>
               <a:pPr/>
-              <a:t>8/10/2024</a:t>
+              <a:t>8/12/2024</a:t>
             </a:fld>
             <a:endParaRPr lang="en-US" dirty="0"/>
           </a:p>
@@ -1304,7 +1305,7 @@
     </p:spTree>
     <p:extLst>
       <p:ext uri="{BB962C8B-B14F-4D97-AF65-F5344CB8AC3E}">
-        <p14:creationId xmlns="" xmlns:p14="http://schemas.microsoft.com/office/powerpoint/2010/main" val="1347279164"/>
+        <p14:creationId xmlns:p14="http://schemas.microsoft.com/office/powerpoint/2010/main" xmlns="" val="1347279164"/>
       </p:ext>
     </p:extLst>
   </p:cSld>
@@ -1621,7 +1622,7 @@
             <a:fld id="{388BEFF6-CA1E-4F2C-AB17-C8AC986E5615}" type="datetimeFigureOut">
               <a:rPr lang="en-US" smtClean="0"/>
               <a:pPr/>
-              <a:t>8/10/2024</a:t>
+              <a:t>8/12/2024</a:t>
             </a:fld>
             <a:endParaRPr lang="en-US" dirty="0"/>
           </a:p>
@@ -1673,7 +1674,7 @@
     </p:spTree>
     <p:extLst>
       <p:ext uri="{BB962C8B-B14F-4D97-AF65-F5344CB8AC3E}">
-        <p14:creationId xmlns="" xmlns:p14="http://schemas.microsoft.com/office/powerpoint/2010/main" val="2734694137"/>
+        <p14:creationId xmlns:p14="http://schemas.microsoft.com/office/powerpoint/2010/main" xmlns="" val="2734694137"/>
       </p:ext>
     </p:extLst>
   </p:cSld>
@@ -1741,7 +1742,7 @@
             <a:fld id="{388BEFF6-CA1E-4F2C-AB17-C8AC986E5615}" type="datetimeFigureOut">
               <a:rPr lang="en-US" smtClean="0"/>
               <a:pPr/>
-              <a:t>8/10/2024</a:t>
+              <a:t>8/12/2024</a:t>
             </a:fld>
             <a:endParaRPr lang="en-US" dirty="0"/>
           </a:p>
@@ -1793,7 +1794,7 @@
     </p:spTree>
     <p:extLst>
       <p:ext uri="{BB962C8B-B14F-4D97-AF65-F5344CB8AC3E}">
-        <p14:creationId xmlns="" xmlns:p14="http://schemas.microsoft.com/office/powerpoint/2010/main" val="2753302791"/>
+        <p14:creationId xmlns:p14="http://schemas.microsoft.com/office/powerpoint/2010/main" xmlns="" val="2753302791"/>
       </p:ext>
     </p:extLst>
   </p:cSld>
@@ -1838,7 +1839,7 @@
             <a:fld id="{388BEFF6-CA1E-4F2C-AB17-C8AC986E5615}" type="datetimeFigureOut">
               <a:rPr lang="en-US" smtClean="0"/>
               <a:pPr/>
-              <a:t>8/10/2024</a:t>
+              <a:t>8/12/2024</a:t>
             </a:fld>
             <a:endParaRPr lang="en-US" dirty="0"/>
           </a:p>
@@ -1890,7 +1891,7 @@
     </p:spTree>
     <p:extLst>
       <p:ext uri="{BB962C8B-B14F-4D97-AF65-F5344CB8AC3E}">
-        <p14:creationId xmlns="" xmlns:p14="http://schemas.microsoft.com/office/powerpoint/2010/main" val="2106617271"/>
+        <p14:creationId xmlns:p14="http://schemas.microsoft.com/office/powerpoint/2010/main" xmlns="" val="2106617271"/>
       </p:ext>
     </p:extLst>
   </p:cSld>
@@ -2117,7 +2118,7 @@
             <a:fld id="{388BEFF6-CA1E-4F2C-AB17-C8AC986E5615}" type="datetimeFigureOut">
               <a:rPr lang="en-US" smtClean="0"/>
               <a:pPr/>
-              <a:t>8/10/2024</a:t>
+              <a:t>8/12/2024</a:t>
             </a:fld>
             <a:endParaRPr lang="en-US" dirty="0"/>
           </a:p>
@@ -2169,7 +2170,7 @@
     </p:spTree>
     <p:extLst>
       <p:ext uri="{BB962C8B-B14F-4D97-AF65-F5344CB8AC3E}">
-        <p14:creationId xmlns="" xmlns:p14="http://schemas.microsoft.com/office/powerpoint/2010/main" val="2943008422"/>
+        <p14:creationId xmlns:p14="http://schemas.microsoft.com/office/powerpoint/2010/main" xmlns="" val="2943008422"/>
       </p:ext>
     </p:extLst>
   </p:cSld>
@@ -2372,7 +2373,7 @@
             <a:fld id="{388BEFF6-CA1E-4F2C-AB17-C8AC986E5615}" type="datetimeFigureOut">
               <a:rPr lang="en-US" smtClean="0"/>
               <a:pPr/>
-              <a:t>8/10/2024</a:t>
+              <a:t>8/12/2024</a:t>
             </a:fld>
             <a:endParaRPr lang="en-US" dirty="0"/>
           </a:p>
@@ -2424,7 +2425,7 @@
     </p:spTree>
     <p:extLst>
       <p:ext uri="{BB962C8B-B14F-4D97-AF65-F5344CB8AC3E}">
-        <p14:creationId xmlns="" xmlns:p14="http://schemas.microsoft.com/office/powerpoint/2010/main" val="3509189551"/>
+        <p14:creationId xmlns:p14="http://schemas.microsoft.com/office/powerpoint/2010/main" xmlns="" val="3509189551"/>
       </p:ext>
     </p:extLst>
   </p:cSld>
@@ -2587,7 +2588,7 @@
             <a:fld id="{388BEFF6-CA1E-4F2C-AB17-C8AC986E5615}" type="datetimeFigureOut">
               <a:rPr lang="en-US" smtClean="0"/>
               <a:pPr/>
-              <a:t>8/10/2024</a:t>
+              <a:t>8/12/2024</a:t>
             </a:fld>
             <a:endParaRPr lang="en-US" dirty="0"/>
           </a:p>
@@ -2675,7 +2676,7 @@
     </p:spTree>
     <p:extLst>
       <p:ext uri="{BB962C8B-B14F-4D97-AF65-F5344CB8AC3E}">
-        <p14:creationId xmlns="" xmlns:p14="http://schemas.microsoft.com/office/powerpoint/2010/main" val="139519878"/>
+        <p14:creationId xmlns:p14="http://schemas.microsoft.com/office/powerpoint/2010/main" xmlns="" val="139519878"/>
       </p:ext>
     </p:extLst>
   </p:cSld>
@@ -2993,6 +2994,4530 @@
           <a:chExt cx="0" cy="0"/>
         </a:xfrm>
       </p:grpSpPr>
+      <p:sp>
+        <p:nvSpPr>
+          <p:cNvPr id="276" name="Rectangle 275"/>
+          <p:cNvSpPr/>
+          <p:nvPr/>
+        </p:nvSpPr>
+        <p:spPr>
+          <a:xfrm>
+            <a:off x="7153274" y="-9525"/>
+            <a:ext cx="5038725" cy="6858000"/>
+          </a:xfrm>
+          <a:prstGeom prst="rect">
+            <a:avLst/>
+          </a:prstGeom>
+          <a:ln/>
+        </p:spPr>
+        <p:style>
+          <a:lnRef idx="1">
+            <a:schemeClr val="accent4"/>
+          </a:lnRef>
+          <a:fillRef idx="2">
+            <a:schemeClr val="accent4"/>
+          </a:fillRef>
+          <a:effectRef idx="1">
+            <a:schemeClr val="accent4"/>
+          </a:effectRef>
+          <a:fontRef idx="minor">
+            <a:schemeClr val="dk1"/>
+          </a:fontRef>
+        </p:style>
+        <p:txBody>
+          <a:bodyPr rtlCol="0" anchor="t"/>
+          <a:lstStyle/>
+          <a:p>
+            <a:pPr algn="r"/>
+            <a:r>
+              <a:rPr lang="en-US" b="1" dirty="0" smtClean="0">
+                <a:solidFill>
+                  <a:schemeClr val="accent2">
+                    <a:lumMod val="75000"/>
+                  </a:schemeClr>
+                </a:solidFill>
+              </a:rPr>
+              <a:t>Secondary / Driven Adapter</a:t>
+            </a:r>
+            <a:endParaRPr lang="en-US" b="1" dirty="0">
+              <a:solidFill>
+                <a:schemeClr val="accent2">
+                  <a:lumMod val="75000"/>
+                </a:schemeClr>
+              </a:solidFill>
+            </a:endParaRPr>
+          </a:p>
+        </p:txBody>
+      </p:sp>
+      <p:sp>
+        <p:nvSpPr>
+          <p:cNvPr id="256" name="Rectangle 255"/>
+          <p:cNvSpPr/>
+          <p:nvPr/>
+        </p:nvSpPr>
+        <p:spPr>
+          <a:xfrm>
+            <a:off x="0" y="0"/>
+            <a:ext cx="7162800" cy="6858000"/>
+          </a:xfrm>
+          <a:prstGeom prst="rect">
+            <a:avLst/>
+          </a:prstGeom>
+          <a:ln>
+            <a:noFill/>
+          </a:ln>
+        </p:spPr>
+        <p:style>
+          <a:lnRef idx="1">
+            <a:schemeClr val="accent6"/>
+          </a:lnRef>
+          <a:fillRef idx="2">
+            <a:schemeClr val="accent6"/>
+          </a:fillRef>
+          <a:effectRef idx="1">
+            <a:schemeClr val="accent6"/>
+          </a:effectRef>
+          <a:fontRef idx="minor">
+            <a:schemeClr val="dk1"/>
+          </a:fontRef>
+        </p:style>
+        <p:txBody>
+          <a:bodyPr rtlCol="0" anchor="t"/>
+          <a:lstStyle/>
+          <a:p>
+            <a:r>
+              <a:rPr lang="en-US" b="1" dirty="0" smtClean="0">
+                <a:solidFill>
+                  <a:schemeClr val="accent6">
+                    <a:lumMod val="75000"/>
+                  </a:schemeClr>
+                </a:solidFill>
+              </a:rPr>
+              <a:t>Primary / Driving Adapter</a:t>
+            </a:r>
+            <a:endParaRPr lang="en-US" b="1" dirty="0">
+              <a:solidFill>
+                <a:schemeClr val="accent6">
+                  <a:lumMod val="75000"/>
+                </a:schemeClr>
+              </a:solidFill>
+            </a:endParaRPr>
+          </a:p>
+        </p:txBody>
+      </p:sp>
+      <p:sp>
+        <p:nvSpPr>
+          <p:cNvPr id="6" name="Hexagone 5"/>
+          <p:cNvSpPr/>
+          <p:nvPr/>
+        </p:nvSpPr>
+        <p:spPr>
+          <a:xfrm>
+            <a:off x="3790950" y="495299"/>
+            <a:ext cx="6372225" cy="5067301"/>
+          </a:xfrm>
+          <a:prstGeom prst="hexagon">
+            <a:avLst/>
+          </a:prstGeom>
+          <a:solidFill>
+            <a:schemeClr val="accent1"/>
+          </a:solidFill>
+        </p:spPr>
+        <p:style>
+          <a:lnRef idx="1">
+            <a:schemeClr val="accent5"/>
+          </a:lnRef>
+          <a:fillRef idx="3">
+            <a:schemeClr val="accent5"/>
+          </a:fillRef>
+          <a:effectRef idx="2">
+            <a:schemeClr val="accent5"/>
+          </a:effectRef>
+          <a:fontRef idx="minor">
+            <a:schemeClr val="lt1"/>
+          </a:fontRef>
+        </p:style>
+        <p:txBody>
+          <a:bodyPr rtlCol="0" anchor="t"/>
+          <a:lstStyle/>
+          <a:p>
+            <a:pPr algn="ctr"/>
+            <a:endParaRPr lang="en-US" dirty="0"/>
+          </a:p>
+        </p:txBody>
+      </p:sp>
+      <p:sp>
+        <p:nvSpPr>
+          <p:cNvPr id="10" name="Rectangle 9"/>
+          <p:cNvSpPr/>
+          <p:nvPr/>
+        </p:nvSpPr>
+        <p:spPr>
+          <a:xfrm>
+            <a:off x="3989852" y="4447546"/>
+            <a:ext cx="914400" cy="182880"/>
+          </a:xfrm>
+          <a:prstGeom prst="rect">
+            <a:avLst/>
+          </a:prstGeom>
+        </p:spPr>
+        <p:style>
+          <a:lnRef idx="2">
+            <a:schemeClr val="accent1"/>
+          </a:lnRef>
+          <a:fillRef idx="1">
+            <a:schemeClr val="lt1"/>
+          </a:fillRef>
+          <a:effectRef idx="0">
+            <a:schemeClr val="accent1"/>
+          </a:effectRef>
+          <a:fontRef idx="minor">
+            <a:schemeClr val="dk1"/>
+          </a:fontRef>
+        </p:style>
+        <p:txBody>
+          <a:bodyPr rtlCol="0" anchor="ctr"/>
+          <a:lstStyle/>
+          <a:p>
+            <a:r>
+              <a:rPr lang="en-US" sz="800" dirty="0" smtClean="0"/>
+              <a:t>ENG_RAYLIB5</a:t>
+            </a:r>
+            <a:endParaRPr lang="en-US" sz="800" dirty="0"/>
+          </a:p>
+        </p:txBody>
+      </p:sp>
+      <p:sp>
+        <p:nvSpPr>
+          <p:cNvPr id="11" name="Rectangle 10"/>
+          <p:cNvSpPr/>
+          <p:nvPr/>
+        </p:nvSpPr>
+        <p:spPr>
+          <a:xfrm>
+            <a:off x="4027046" y="1519295"/>
+            <a:ext cx="914400" cy="182880"/>
+          </a:xfrm>
+          <a:prstGeom prst="rect">
+            <a:avLst/>
+          </a:prstGeom>
+        </p:spPr>
+        <p:style>
+          <a:lnRef idx="2">
+            <a:schemeClr val="accent1"/>
+          </a:lnRef>
+          <a:fillRef idx="1">
+            <a:schemeClr val="lt1"/>
+          </a:fillRef>
+          <a:effectRef idx="0">
+            <a:schemeClr val="accent1"/>
+          </a:effectRef>
+          <a:fontRef idx="minor">
+            <a:schemeClr val="dk1"/>
+          </a:fontRef>
+        </p:style>
+        <p:txBody>
+          <a:bodyPr rtlCol="0" anchor="ctr"/>
+          <a:lstStyle/>
+          <a:p>
+            <a:r>
+              <a:rPr lang="en-US" sz="800" dirty="0" smtClean="0"/>
+              <a:t>ENG_UNREAL5</a:t>
+            </a:r>
+            <a:endParaRPr lang="en-US" sz="800" dirty="0"/>
+          </a:p>
+        </p:txBody>
+      </p:sp>
+      <p:sp>
+        <p:nvSpPr>
+          <p:cNvPr id="19" name="Rectangle 18"/>
+          <p:cNvSpPr/>
+          <p:nvPr/>
+        </p:nvSpPr>
+        <p:spPr>
+          <a:xfrm>
+            <a:off x="9473532" y="4001233"/>
+            <a:ext cx="914400" cy="182880"/>
+          </a:xfrm>
+          <a:prstGeom prst="rect">
+            <a:avLst/>
+          </a:prstGeom>
+        </p:spPr>
+        <p:style>
+          <a:lnRef idx="2">
+            <a:schemeClr val="accent1"/>
+          </a:lnRef>
+          <a:fillRef idx="1">
+            <a:schemeClr val="lt1"/>
+          </a:fillRef>
+          <a:effectRef idx="0">
+            <a:schemeClr val="accent1"/>
+          </a:effectRef>
+          <a:fontRef idx="minor">
+            <a:schemeClr val="dk1"/>
+          </a:fontRef>
+        </p:style>
+        <p:txBody>
+          <a:bodyPr rtlCol="0" anchor="ctr"/>
+          <a:lstStyle/>
+          <a:p>
+            <a:r>
+              <a:rPr lang="en-US" sz="800" dirty="0" smtClean="0"/>
+              <a:t>ENG_WINDOWS</a:t>
+            </a:r>
+            <a:endParaRPr lang="en-US" sz="800" dirty="0"/>
+          </a:p>
+        </p:txBody>
+      </p:sp>
+      <p:sp>
+        <p:nvSpPr>
+          <p:cNvPr id="103" name="Rectangle 102"/>
+          <p:cNvSpPr/>
+          <p:nvPr/>
+        </p:nvSpPr>
+        <p:spPr>
+          <a:xfrm>
+            <a:off x="9307524" y="1862643"/>
+            <a:ext cx="914400" cy="182880"/>
+          </a:xfrm>
+          <a:prstGeom prst="rect">
+            <a:avLst/>
+          </a:prstGeom>
+        </p:spPr>
+        <p:style>
+          <a:lnRef idx="2">
+            <a:schemeClr val="accent1"/>
+          </a:lnRef>
+          <a:fillRef idx="1">
+            <a:schemeClr val="lt1"/>
+          </a:fillRef>
+          <a:effectRef idx="0">
+            <a:schemeClr val="accent1"/>
+          </a:effectRef>
+          <a:fontRef idx="minor">
+            <a:schemeClr val="dk1"/>
+          </a:fontRef>
+        </p:style>
+        <p:txBody>
+          <a:bodyPr rtlCol="0" anchor="ctr"/>
+          <a:lstStyle/>
+          <a:p>
+            <a:r>
+              <a:rPr lang="en-US" sz="800" dirty="0" smtClean="0"/>
+              <a:t>ENG_JOLT</a:t>
+            </a:r>
+            <a:endParaRPr lang="en-US" sz="800" dirty="0"/>
+          </a:p>
+        </p:txBody>
+      </p:sp>
+      <p:sp>
+        <p:nvSpPr>
+          <p:cNvPr id="121" name="Hexagone 120"/>
+          <p:cNvSpPr/>
+          <p:nvPr/>
+        </p:nvSpPr>
+        <p:spPr>
+          <a:xfrm>
+            <a:off x="10325100" y="1152525"/>
+            <a:ext cx="1371600" cy="1188720"/>
+          </a:xfrm>
+          <a:prstGeom prst="hexagon">
+            <a:avLst/>
+          </a:prstGeom>
+          <a:solidFill>
+            <a:schemeClr val="accent1"/>
+          </a:solidFill>
+        </p:spPr>
+        <p:style>
+          <a:lnRef idx="1">
+            <a:schemeClr val="accent5"/>
+          </a:lnRef>
+          <a:fillRef idx="3">
+            <a:schemeClr val="accent5"/>
+          </a:fillRef>
+          <a:effectRef idx="2">
+            <a:schemeClr val="accent5"/>
+          </a:effectRef>
+          <a:fontRef idx="minor">
+            <a:schemeClr val="lt1"/>
+          </a:fontRef>
+        </p:style>
+        <p:txBody>
+          <a:bodyPr rtlCol="0" anchor="ctr"/>
+          <a:lstStyle/>
+          <a:p>
+            <a:pPr algn="ctr"/>
+            <a:endParaRPr lang="en-US" dirty="0"/>
+          </a:p>
+        </p:txBody>
+      </p:sp>
+      <p:sp>
+        <p:nvSpPr>
+          <p:cNvPr id="125" name="Rectangle 124"/>
+          <p:cNvSpPr/>
+          <p:nvPr/>
+        </p:nvSpPr>
+        <p:spPr>
+          <a:xfrm>
+            <a:off x="10541881" y="1951616"/>
+            <a:ext cx="914400" cy="182880"/>
+          </a:xfrm>
+          <a:prstGeom prst="rect">
+            <a:avLst/>
+          </a:prstGeom>
+        </p:spPr>
+        <p:style>
+          <a:lnRef idx="2">
+            <a:schemeClr val="accent1"/>
+          </a:lnRef>
+          <a:fillRef idx="1">
+            <a:schemeClr val="lt1"/>
+          </a:fillRef>
+          <a:effectRef idx="0">
+            <a:schemeClr val="accent1"/>
+          </a:effectRef>
+          <a:fontRef idx="minor">
+            <a:schemeClr val="dk1"/>
+          </a:fontRef>
+        </p:style>
+        <p:txBody>
+          <a:bodyPr rtlCol="0" anchor="ctr"/>
+          <a:lstStyle/>
+          <a:p>
+            <a:r>
+              <a:rPr lang="en-US" sz="800" dirty="0" smtClean="0"/>
+              <a:t>JOLT DLL</a:t>
+            </a:r>
+            <a:endParaRPr lang="en-US" sz="800" dirty="0"/>
+          </a:p>
+        </p:txBody>
+      </p:sp>
+      <p:sp>
+        <p:nvSpPr>
+          <p:cNvPr id="185" name="Rectangle 184"/>
+          <p:cNvSpPr/>
+          <p:nvPr/>
+        </p:nvSpPr>
+        <p:spPr>
+          <a:xfrm>
+            <a:off x="10541881" y="1703966"/>
+            <a:ext cx="914400" cy="182880"/>
+          </a:xfrm>
+          <a:prstGeom prst="rect">
+            <a:avLst/>
+          </a:prstGeom>
+        </p:spPr>
+        <p:style>
+          <a:lnRef idx="2">
+            <a:schemeClr val="accent1"/>
+          </a:lnRef>
+          <a:fillRef idx="1">
+            <a:schemeClr val="lt1"/>
+          </a:fillRef>
+          <a:effectRef idx="0">
+            <a:schemeClr val="accent1"/>
+          </a:effectRef>
+          <a:fontRef idx="minor">
+            <a:schemeClr val="dk1"/>
+          </a:fontRef>
+        </p:style>
+        <p:txBody>
+          <a:bodyPr rtlCol="0" anchor="ctr"/>
+          <a:lstStyle/>
+          <a:p>
+            <a:r>
+              <a:rPr lang="en-US" sz="800" dirty="0" smtClean="0"/>
+              <a:t>JOLT HEADERS</a:t>
+            </a:r>
+            <a:endParaRPr lang="en-US" sz="800" dirty="0"/>
+          </a:p>
+        </p:txBody>
+      </p:sp>
+      <p:cxnSp>
+        <p:nvCxnSpPr>
+          <p:cNvPr id="187" name="Connecteur droit avec flèche 186"/>
+          <p:cNvCxnSpPr>
+            <a:stCxn id="103" idx="3"/>
+            <a:endCxn id="185" idx="1"/>
+          </p:cNvCxnSpPr>
+          <p:nvPr/>
+        </p:nvCxnSpPr>
+        <p:spPr>
+          <a:xfrm flipV="1">
+            <a:off x="10221924" y="1795406"/>
+            <a:ext cx="319957" cy="158677"/>
+          </a:xfrm>
+          <a:prstGeom prst="straightConnector1">
+            <a:avLst/>
+          </a:prstGeom>
+          <a:ln w="38100">
+            <a:solidFill>
+              <a:schemeClr val="tx1"/>
+            </a:solidFill>
+            <a:headEnd type="none" w="med" len="med"/>
+            <a:tailEnd type="triangle" w="med" len="med"/>
+          </a:ln>
+        </p:spPr>
+        <p:style>
+          <a:lnRef idx="3">
+            <a:schemeClr val="dk1"/>
+          </a:lnRef>
+          <a:fillRef idx="0">
+            <a:schemeClr val="dk1"/>
+          </a:fillRef>
+          <a:effectRef idx="2">
+            <a:schemeClr val="dk1"/>
+          </a:effectRef>
+          <a:fontRef idx="minor">
+            <a:schemeClr val="tx1"/>
+          </a:fontRef>
+        </p:style>
+      </p:cxnSp>
+      <p:pic>
+        <p:nvPicPr>
+          <p:cNvPr id="1026" name="Picture 2"/>
+          <p:cNvPicPr>
+            <a:picLocks noChangeAspect="1" noChangeArrowheads="1"/>
+          </p:cNvPicPr>
+          <p:nvPr/>
+        </p:nvPicPr>
+        <p:blipFill>
+          <a:blip r:embed="rId2" cstate="print"/>
+          <a:srcRect/>
+          <a:stretch>
+            <a:fillRect/>
+          </a:stretch>
+        </p:blipFill>
+        <p:spPr bwMode="auto">
+          <a:xfrm>
+            <a:off x="10758489" y="1290638"/>
+            <a:ext cx="434942" cy="357187"/>
+          </a:xfrm>
+          <a:prstGeom prst="rect">
+            <a:avLst/>
+          </a:prstGeom>
+          <a:noFill/>
+          <a:ln w="9525">
+            <a:noFill/>
+            <a:miter lim="800000"/>
+            <a:headEnd/>
+            <a:tailEnd/>
+          </a:ln>
+          <a:effectLst/>
+        </p:spPr>
+      </p:pic>
+      <p:sp>
+        <p:nvSpPr>
+          <p:cNvPr id="277" name="Hexagone 276"/>
+          <p:cNvSpPr/>
+          <p:nvPr/>
+        </p:nvSpPr>
+        <p:spPr>
+          <a:xfrm>
+            <a:off x="10525125" y="3848100"/>
+            <a:ext cx="1280160" cy="1188720"/>
+          </a:xfrm>
+          <a:prstGeom prst="hexagon">
+            <a:avLst/>
+          </a:prstGeom>
+          <a:solidFill>
+            <a:schemeClr val="accent1"/>
+          </a:solidFill>
+        </p:spPr>
+        <p:style>
+          <a:lnRef idx="1">
+            <a:schemeClr val="accent5"/>
+          </a:lnRef>
+          <a:fillRef idx="3">
+            <a:schemeClr val="accent5"/>
+          </a:fillRef>
+          <a:effectRef idx="2">
+            <a:schemeClr val="accent5"/>
+          </a:effectRef>
+          <a:fontRef idx="minor">
+            <a:schemeClr val="lt1"/>
+          </a:fontRef>
+        </p:style>
+        <p:txBody>
+          <a:bodyPr rtlCol="0" anchor="ctr"/>
+          <a:lstStyle/>
+          <a:p>
+            <a:pPr algn="ctr"/>
+            <a:endParaRPr lang="en-US" dirty="0"/>
+          </a:p>
+        </p:txBody>
+      </p:sp>
+      <p:sp>
+        <p:nvSpPr>
+          <p:cNvPr id="279" name="Rectangle 278"/>
+          <p:cNvSpPr/>
+          <p:nvPr/>
+        </p:nvSpPr>
+        <p:spPr>
+          <a:xfrm>
+            <a:off x="10703806" y="4399541"/>
+            <a:ext cx="914400" cy="182880"/>
+          </a:xfrm>
+          <a:prstGeom prst="rect">
+            <a:avLst/>
+          </a:prstGeom>
+        </p:spPr>
+        <p:style>
+          <a:lnRef idx="2">
+            <a:schemeClr val="accent1"/>
+          </a:lnRef>
+          <a:fillRef idx="1">
+            <a:schemeClr val="lt1"/>
+          </a:fillRef>
+          <a:effectRef idx="0">
+            <a:schemeClr val="accent1"/>
+          </a:effectRef>
+          <a:fontRef idx="minor">
+            <a:schemeClr val="dk1"/>
+          </a:fontRef>
+        </p:style>
+        <p:txBody>
+          <a:bodyPr rtlCol="0" anchor="ctr"/>
+          <a:lstStyle/>
+          <a:p>
+            <a:r>
+              <a:rPr lang="en-US" sz="800" dirty="0" smtClean="0"/>
+              <a:t>WINMM LIB</a:t>
+            </a:r>
+            <a:endParaRPr lang="en-US" sz="800" dirty="0"/>
+          </a:p>
+        </p:txBody>
+      </p:sp>
+      <p:cxnSp>
+        <p:nvCxnSpPr>
+          <p:cNvPr id="281" name="Connecteur droit avec flèche 280"/>
+          <p:cNvCxnSpPr>
+            <a:stCxn id="19" idx="3"/>
+            <a:endCxn id="279" idx="1"/>
+          </p:cNvCxnSpPr>
+          <p:nvPr/>
+        </p:nvCxnSpPr>
+        <p:spPr>
+          <a:xfrm>
+            <a:off x="10387932" y="4092673"/>
+            <a:ext cx="315874" cy="398308"/>
+          </a:xfrm>
+          <a:prstGeom prst="straightConnector1">
+            <a:avLst/>
+          </a:prstGeom>
+          <a:ln w="38100">
+            <a:solidFill>
+              <a:schemeClr val="tx1"/>
+            </a:solidFill>
+            <a:headEnd type="none" w="med" len="med"/>
+            <a:tailEnd type="triangle" w="med" len="med"/>
+          </a:ln>
+        </p:spPr>
+        <p:style>
+          <a:lnRef idx="3">
+            <a:schemeClr val="dk1"/>
+          </a:lnRef>
+          <a:fillRef idx="0">
+            <a:schemeClr val="dk1"/>
+          </a:fillRef>
+          <a:effectRef idx="2">
+            <a:schemeClr val="dk1"/>
+          </a:effectRef>
+          <a:fontRef idx="minor">
+            <a:schemeClr val="tx1"/>
+          </a:fontRef>
+        </p:style>
+      </p:cxnSp>
+      <p:pic>
+        <p:nvPicPr>
+          <p:cNvPr id="1028" name="Picture 4" descr="File - Free files and folders icons"/>
+          <p:cNvPicPr>
+            <a:picLocks noChangeAspect="1" noChangeArrowheads="1"/>
+          </p:cNvPicPr>
+          <p:nvPr/>
+        </p:nvPicPr>
+        <p:blipFill>
+          <a:blip r:embed="rId3" cstate="print"/>
+          <a:srcRect/>
+          <a:stretch>
+            <a:fillRect/>
+          </a:stretch>
+        </p:blipFill>
+        <p:spPr bwMode="auto">
+          <a:xfrm>
+            <a:off x="11534775" y="5459414"/>
+            <a:ext cx="657225" cy="657225"/>
+          </a:xfrm>
+          <a:prstGeom prst="rect">
+            <a:avLst/>
+          </a:prstGeom>
+          <a:noFill/>
+        </p:spPr>
+      </p:pic>
+      <p:cxnSp>
+        <p:nvCxnSpPr>
+          <p:cNvPr id="288" name="Connecteur droit avec flèche 287"/>
+          <p:cNvCxnSpPr>
+            <a:stCxn id="279" idx="3"/>
+            <a:endCxn id="1028" idx="0"/>
+          </p:cNvCxnSpPr>
+          <p:nvPr/>
+        </p:nvCxnSpPr>
+        <p:spPr>
+          <a:xfrm>
+            <a:off x="11618206" y="4490981"/>
+            <a:ext cx="245182" cy="968433"/>
+          </a:xfrm>
+          <a:prstGeom prst="straightConnector1">
+            <a:avLst/>
+          </a:prstGeom>
+          <a:ln w="38100">
+            <a:solidFill>
+              <a:schemeClr val="tx1"/>
+            </a:solidFill>
+            <a:headEnd type="none" w="med" len="med"/>
+            <a:tailEnd type="triangle" w="med" len="med"/>
+          </a:ln>
+        </p:spPr>
+        <p:style>
+          <a:lnRef idx="3">
+            <a:schemeClr val="dk1"/>
+          </a:lnRef>
+          <a:fillRef idx="0">
+            <a:schemeClr val="dk1"/>
+          </a:fillRef>
+          <a:effectRef idx="2">
+            <a:schemeClr val="dk1"/>
+          </a:effectRef>
+          <a:fontRef idx="minor">
+            <a:schemeClr val="tx1"/>
+          </a:fontRef>
+        </p:style>
+      </p:cxnSp>
+      <p:cxnSp>
+        <p:nvCxnSpPr>
+          <p:cNvPr id="395" name="Connecteur droit avec flèche 394"/>
+          <p:cNvCxnSpPr>
+            <a:stCxn id="11" idx="3"/>
+            <a:endCxn id="102" idx="1"/>
+          </p:cNvCxnSpPr>
+          <p:nvPr/>
+        </p:nvCxnSpPr>
+        <p:spPr>
+          <a:xfrm>
+            <a:off x="4941446" y="1610735"/>
+            <a:ext cx="575128" cy="362398"/>
+          </a:xfrm>
+          <a:prstGeom prst="straightConnector1">
+            <a:avLst/>
+          </a:prstGeom>
+          <a:ln w="38100">
+            <a:solidFill>
+              <a:schemeClr val="tx1"/>
+            </a:solidFill>
+            <a:headEnd type="none" w="med" len="med"/>
+            <a:tailEnd type="triangle" w="med" len="med"/>
+          </a:ln>
+        </p:spPr>
+        <p:style>
+          <a:lnRef idx="3">
+            <a:schemeClr val="dk1"/>
+          </a:lnRef>
+          <a:fillRef idx="0">
+            <a:schemeClr val="dk1"/>
+          </a:fillRef>
+          <a:effectRef idx="2">
+            <a:schemeClr val="dk1"/>
+          </a:effectRef>
+          <a:fontRef idx="minor">
+            <a:schemeClr val="tx1"/>
+          </a:fontRef>
+        </p:style>
+      </p:cxnSp>
+      <p:sp>
+        <p:nvSpPr>
+          <p:cNvPr id="524" name="Rectangle 523"/>
+          <p:cNvSpPr/>
+          <p:nvPr/>
+        </p:nvSpPr>
+        <p:spPr>
+          <a:xfrm>
+            <a:off x="5608099" y="5568434"/>
+            <a:ext cx="1528945" cy="369332"/>
+          </a:xfrm>
+          <a:prstGeom prst="rect">
+            <a:avLst/>
+          </a:prstGeom>
+        </p:spPr>
+        <p:txBody>
+          <a:bodyPr wrap="none">
+            <a:spAutoFit/>
+          </a:bodyPr>
+          <a:lstStyle/>
+          <a:p>
+            <a:pPr algn="r"/>
+            <a:r>
+              <a:rPr lang="en-US" b="1" dirty="0" smtClean="0">
+                <a:solidFill>
+                  <a:schemeClr val="accent6">
+                    <a:lumMod val="75000"/>
+                  </a:schemeClr>
+                </a:solidFill>
+              </a:rPr>
+              <a:t>User Interface</a:t>
+            </a:r>
+            <a:endParaRPr lang="en-US" b="1" dirty="0">
+              <a:solidFill>
+                <a:schemeClr val="accent6">
+                  <a:lumMod val="75000"/>
+                </a:schemeClr>
+              </a:solidFill>
+            </a:endParaRPr>
+          </a:p>
+        </p:txBody>
+      </p:sp>
+      <p:sp>
+        <p:nvSpPr>
+          <p:cNvPr id="526" name="Rectangle 525"/>
+          <p:cNvSpPr/>
+          <p:nvPr/>
+        </p:nvSpPr>
+        <p:spPr>
+          <a:xfrm>
+            <a:off x="7159115" y="5568434"/>
+            <a:ext cx="1500539" cy="369332"/>
+          </a:xfrm>
+          <a:prstGeom prst="rect">
+            <a:avLst/>
+          </a:prstGeom>
+        </p:spPr>
+        <p:txBody>
+          <a:bodyPr wrap="none">
+            <a:spAutoFit/>
+          </a:bodyPr>
+          <a:lstStyle/>
+          <a:p>
+            <a:pPr algn="r"/>
+            <a:r>
+              <a:rPr lang="en-US" b="1" dirty="0" smtClean="0">
+                <a:solidFill>
+                  <a:schemeClr val="accent2">
+                    <a:lumMod val="75000"/>
+                  </a:schemeClr>
+                </a:solidFill>
+              </a:rPr>
+              <a:t>Infrastructure</a:t>
+            </a:r>
+            <a:endParaRPr lang="en-US" b="1" dirty="0">
+              <a:solidFill>
+                <a:schemeClr val="accent2">
+                  <a:lumMod val="75000"/>
+                </a:schemeClr>
+              </a:solidFill>
+            </a:endParaRPr>
+          </a:p>
+        </p:txBody>
+      </p:sp>
+      <p:cxnSp>
+        <p:nvCxnSpPr>
+          <p:cNvPr id="534" name="Connecteur droit 533"/>
+          <p:cNvCxnSpPr/>
+          <p:nvPr/>
+        </p:nvCxnSpPr>
+        <p:spPr>
+          <a:xfrm rot="5400000">
+            <a:off x="2762251" y="485775"/>
+            <a:ext cx="7820025" cy="5915025"/>
+          </a:xfrm>
+          <a:prstGeom prst="line">
+            <a:avLst/>
+          </a:prstGeom>
+          <a:ln>
+            <a:solidFill>
+              <a:schemeClr val="bg1"/>
+            </a:solidFill>
+            <a:prstDash val="lgDash"/>
+          </a:ln>
+        </p:spPr>
+        <p:style>
+          <a:lnRef idx="1">
+            <a:schemeClr val="accent1"/>
+          </a:lnRef>
+          <a:fillRef idx="0">
+            <a:schemeClr val="accent1"/>
+          </a:fillRef>
+          <a:effectRef idx="0">
+            <a:schemeClr val="accent1"/>
+          </a:effectRef>
+          <a:fontRef idx="minor">
+            <a:schemeClr val="tx1"/>
+          </a:fontRef>
+        </p:style>
+      </p:cxnSp>
+      <p:cxnSp>
+        <p:nvCxnSpPr>
+          <p:cNvPr id="536" name="Connecteur droit 535"/>
+          <p:cNvCxnSpPr/>
+          <p:nvPr/>
+        </p:nvCxnSpPr>
+        <p:spPr>
+          <a:xfrm rot="16200000" flipH="1">
+            <a:off x="3243263" y="280987"/>
+            <a:ext cx="7896225" cy="5981700"/>
+          </a:xfrm>
+          <a:prstGeom prst="line">
+            <a:avLst/>
+          </a:prstGeom>
+          <a:ln>
+            <a:solidFill>
+              <a:schemeClr val="bg1"/>
+            </a:solidFill>
+            <a:prstDash val="lgDash"/>
+          </a:ln>
+        </p:spPr>
+        <p:style>
+          <a:lnRef idx="1">
+            <a:schemeClr val="accent1"/>
+          </a:lnRef>
+          <a:fillRef idx="0">
+            <a:schemeClr val="accent1"/>
+          </a:fillRef>
+          <a:effectRef idx="0">
+            <a:schemeClr val="accent1"/>
+          </a:effectRef>
+          <a:fontRef idx="minor">
+            <a:schemeClr val="tx1"/>
+          </a:fontRef>
+        </p:style>
+      </p:cxnSp>
+      <p:cxnSp>
+        <p:nvCxnSpPr>
+          <p:cNvPr id="539" name="Connecteur droit 538"/>
+          <p:cNvCxnSpPr/>
+          <p:nvPr/>
+        </p:nvCxnSpPr>
+        <p:spPr>
+          <a:xfrm flipV="1">
+            <a:off x="-885825" y="3009900"/>
+            <a:ext cx="13077825" cy="66675"/>
+          </a:xfrm>
+          <a:prstGeom prst="line">
+            <a:avLst/>
+          </a:prstGeom>
+          <a:ln>
+            <a:solidFill>
+              <a:schemeClr val="bg1"/>
+            </a:solidFill>
+            <a:prstDash val="lgDash"/>
+          </a:ln>
+        </p:spPr>
+        <p:style>
+          <a:lnRef idx="1">
+            <a:schemeClr val="accent1"/>
+          </a:lnRef>
+          <a:fillRef idx="0">
+            <a:schemeClr val="accent1"/>
+          </a:fillRef>
+          <a:effectRef idx="0">
+            <a:schemeClr val="accent1"/>
+          </a:effectRef>
+          <a:fontRef idx="minor">
+            <a:schemeClr val="tx1"/>
+          </a:fontRef>
+        </p:style>
+      </p:cxnSp>
+      <p:sp>
+        <p:nvSpPr>
+          <p:cNvPr id="5" name="Hexagone 4"/>
+          <p:cNvSpPr/>
+          <p:nvPr/>
+        </p:nvSpPr>
+        <p:spPr>
+          <a:xfrm>
+            <a:off x="4914900" y="1438275"/>
+            <a:ext cx="4171950" cy="3267075"/>
+          </a:xfrm>
+          <a:prstGeom prst="hexagon">
+            <a:avLst/>
+          </a:prstGeom>
+          <a:solidFill>
+            <a:srgbClr val="F54629"/>
+          </a:solidFill>
+          <a:ln>
+            <a:noFill/>
+          </a:ln>
+        </p:spPr>
+        <p:style>
+          <a:lnRef idx="1">
+            <a:schemeClr val="accent2"/>
+          </a:lnRef>
+          <a:fillRef idx="3">
+            <a:schemeClr val="accent2"/>
+          </a:fillRef>
+          <a:effectRef idx="2">
+            <a:schemeClr val="accent2"/>
+          </a:effectRef>
+          <a:fontRef idx="minor">
+            <a:schemeClr val="lt1"/>
+          </a:fontRef>
+        </p:style>
+        <p:txBody>
+          <a:bodyPr rtlCol="0" anchor="ctr"/>
+          <a:lstStyle/>
+          <a:p>
+            <a:pPr algn="ctr"/>
+            <a:endParaRPr lang="en-US"/>
+          </a:p>
+        </p:txBody>
+      </p:sp>
+      <p:sp>
+        <p:nvSpPr>
+          <p:cNvPr id="21" name="Rectangle 20"/>
+          <p:cNvSpPr/>
+          <p:nvPr/>
+        </p:nvSpPr>
+        <p:spPr>
+          <a:xfrm>
+            <a:off x="5259399" y="3177093"/>
+            <a:ext cx="914400" cy="182880"/>
+          </a:xfrm>
+          <a:prstGeom prst="rect">
+            <a:avLst/>
+          </a:prstGeom>
+        </p:spPr>
+        <p:style>
+          <a:lnRef idx="2">
+            <a:schemeClr val="accent1"/>
+          </a:lnRef>
+          <a:fillRef idx="1">
+            <a:schemeClr val="lt1"/>
+          </a:fillRef>
+          <a:effectRef idx="0">
+            <a:schemeClr val="accent1"/>
+          </a:effectRef>
+          <a:fontRef idx="minor">
+            <a:schemeClr val="dk1"/>
+          </a:fontRef>
+        </p:style>
+        <p:txBody>
+          <a:bodyPr rtlCol="0" anchor="ctr"/>
+          <a:lstStyle/>
+          <a:p>
+            <a:r>
+              <a:rPr lang="en-US" sz="800" dirty="0" smtClean="0"/>
+              <a:t>ENG_RENDER</a:t>
+            </a:r>
+            <a:endParaRPr lang="en-US" sz="800" dirty="0"/>
+          </a:p>
+        </p:txBody>
+      </p:sp>
+      <p:sp>
+        <p:nvSpPr>
+          <p:cNvPr id="24" name="Rectangle 23"/>
+          <p:cNvSpPr/>
+          <p:nvPr/>
+        </p:nvSpPr>
+        <p:spPr>
+          <a:xfrm>
+            <a:off x="5268924" y="2567493"/>
+            <a:ext cx="914400" cy="182880"/>
+          </a:xfrm>
+          <a:prstGeom prst="rect">
+            <a:avLst/>
+          </a:prstGeom>
+        </p:spPr>
+        <p:style>
+          <a:lnRef idx="2">
+            <a:schemeClr val="accent1"/>
+          </a:lnRef>
+          <a:fillRef idx="1">
+            <a:schemeClr val="lt1"/>
+          </a:fillRef>
+          <a:effectRef idx="0">
+            <a:schemeClr val="accent1"/>
+          </a:effectRef>
+          <a:fontRef idx="minor">
+            <a:schemeClr val="dk1"/>
+          </a:fontRef>
+        </p:style>
+        <p:txBody>
+          <a:bodyPr rtlCol="0" anchor="ctr"/>
+          <a:lstStyle/>
+          <a:p>
+            <a:r>
+              <a:rPr lang="en-US" sz="800" dirty="0" smtClean="0"/>
+              <a:t>ENG_AUDIO</a:t>
+            </a:r>
+            <a:endParaRPr lang="en-US" sz="800" dirty="0"/>
+          </a:p>
+        </p:txBody>
+      </p:sp>
+      <p:sp>
+        <p:nvSpPr>
+          <p:cNvPr id="25" name="Rectangle 24"/>
+          <p:cNvSpPr/>
+          <p:nvPr/>
+        </p:nvSpPr>
+        <p:spPr>
+          <a:xfrm>
+            <a:off x="8197182" y="3772633"/>
+            <a:ext cx="914400" cy="182880"/>
+          </a:xfrm>
+          <a:prstGeom prst="rect">
+            <a:avLst/>
+          </a:prstGeom>
+        </p:spPr>
+        <p:style>
+          <a:lnRef idx="2">
+            <a:schemeClr val="accent1"/>
+          </a:lnRef>
+          <a:fillRef idx="1">
+            <a:schemeClr val="lt1"/>
+          </a:fillRef>
+          <a:effectRef idx="0">
+            <a:schemeClr val="accent1"/>
+          </a:effectRef>
+          <a:fontRef idx="minor">
+            <a:schemeClr val="dk1"/>
+          </a:fontRef>
+        </p:style>
+        <p:txBody>
+          <a:bodyPr rtlCol="0" anchor="ctr"/>
+          <a:lstStyle/>
+          <a:p>
+            <a:r>
+              <a:rPr lang="en-US" sz="800" dirty="0" smtClean="0"/>
+              <a:t>ENG_RESOURCE</a:t>
+            </a:r>
+            <a:endParaRPr lang="en-US" sz="800" dirty="0"/>
+          </a:p>
+        </p:txBody>
+      </p:sp>
+      <p:sp>
+        <p:nvSpPr>
+          <p:cNvPr id="26" name="Rectangle 25"/>
+          <p:cNvSpPr/>
+          <p:nvPr/>
+        </p:nvSpPr>
+        <p:spPr>
+          <a:xfrm>
+            <a:off x="8069274" y="2272218"/>
+            <a:ext cx="1097280" cy="182880"/>
+          </a:xfrm>
+          <a:prstGeom prst="rect">
+            <a:avLst/>
+          </a:prstGeom>
+        </p:spPr>
+        <p:style>
+          <a:lnRef idx="2">
+            <a:schemeClr val="accent1"/>
+          </a:lnRef>
+          <a:fillRef idx="1">
+            <a:schemeClr val="lt1"/>
+          </a:fillRef>
+          <a:effectRef idx="0">
+            <a:schemeClr val="accent1"/>
+          </a:effectRef>
+          <a:fontRef idx="minor">
+            <a:schemeClr val="dk1"/>
+          </a:fontRef>
+        </p:style>
+        <p:txBody>
+          <a:bodyPr rtlCol="0" anchor="ctr"/>
+          <a:lstStyle/>
+          <a:p>
+            <a:r>
+              <a:rPr lang="en-US" sz="800" dirty="0" smtClean="0"/>
+              <a:t>ENG_SRV_PHYSICS</a:t>
+            </a:r>
+            <a:endParaRPr lang="en-US" sz="800" dirty="0"/>
+          </a:p>
+        </p:txBody>
+      </p:sp>
+      <p:sp>
+        <p:nvSpPr>
+          <p:cNvPr id="27" name="Rectangle 26"/>
+          <p:cNvSpPr/>
+          <p:nvPr/>
+        </p:nvSpPr>
+        <p:spPr>
+          <a:xfrm>
+            <a:off x="5268924" y="2805618"/>
+            <a:ext cx="914400" cy="182880"/>
+          </a:xfrm>
+          <a:prstGeom prst="rect">
+            <a:avLst/>
+          </a:prstGeom>
+        </p:spPr>
+        <p:style>
+          <a:lnRef idx="2">
+            <a:schemeClr val="accent1"/>
+          </a:lnRef>
+          <a:fillRef idx="1">
+            <a:schemeClr val="lt1"/>
+          </a:fillRef>
+          <a:effectRef idx="0">
+            <a:schemeClr val="accent1"/>
+          </a:effectRef>
+          <a:fontRef idx="minor">
+            <a:schemeClr val="dk1"/>
+          </a:fontRef>
+        </p:style>
+        <p:txBody>
+          <a:bodyPr rtlCol="0" anchor="ctr"/>
+          <a:lstStyle/>
+          <a:p>
+            <a:r>
+              <a:rPr lang="en-US" sz="800" dirty="0" smtClean="0"/>
+              <a:t>ENG_ANIMATION</a:t>
+            </a:r>
+            <a:endParaRPr lang="en-US" sz="800" dirty="0"/>
+          </a:p>
+        </p:txBody>
+      </p:sp>
+      <p:sp>
+        <p:nvSpPr>
+          <p:cNvPr id="31" name="Rectangle 30"/>
+          <p:cNvSpPr/>
+          <p:nvPr/>
+        </p:nvSpPr>
+        <p:spPr>
+          <a:xfrm>
+            <a:off x="5259399" y="3405693"/>
+            <a:ext cx="914400" cy="182880"/>
+          </a:xfrm>
+          <a:prstGeom prst="rect">
+            <a:avLst/>
+          </a:prstGeom>
+        </p:spPr>
+        <p:style>
+          <a:lnRef idx="2">
+            <a:schemeClr val="accent1"/>
+          </a:lnRef>
+          <a:fillRef idx="1">
+            <a:schemeClr val="lt1"/>
+          </a:fillRef>
+          <a:effectRef idx="0">
+            <a:schemeClr val="accent1"/>
+          </a:effectRef>
+          <a:fontRef idx="minor">
+            <a:schemeClr val="dk1"/>
+          </a:fontRef>
+        </p:style>
+        <p:txBody>
+          <a:bodyPr rtlCol="0" anchor="ctr"/>
+          <a:lstStyle/>
+          <a:p>
+            <a:r>
+              <a:rPr lang="en-US" sz="800" dirty="0" smtClean="0"/>
+              <a:t>ENG_INPUT</a:t>
+            </a:r>
+            <a:endParaRPr lang="en-US" sz="800" dirty="0"/>
+          </a:p>
+        </p:txBody>
+      </p:sp>
+      <p:sp>
+        <p:nvSpPr>
+          <p:cNvPr id="92" name="Rectangle 91"/>
+          <p:cNvSpPr/>
+          <p:nvPr/>
+        </p:nvSpPr>
+        <p:spPr>
+          <a:xfrm>
+            <a:off x="5172075" y="2495550"/>
+            <a:ext cx="1143000" cy="1162050"/>
+          </a:xfrm>
+          <a:prstGeom prst="rect">
+            <a:avLst/>
+          </a:prstGeom>
+          <a:noFill/>
+          <a:ln w="28575">
+            <a:prstDash val="sysDot"/>
+          </a:ln>
+        </p:spPr>
+        <p:style>
+          <a:lnRef idx="2">
+            <a:schemeClr val="dk1"/>
+          </a:lnRef>
+          <a:fillRef idx="1">
+            <a:schemeClr val="lt1"/>
+          </a:fillRef>
+          <a:effectRef idx="0">
+            <a:schemeClr val="dk1"/>
+          </a:effectRef>
+          <a:fontRef idx="minor">
+            <a:schemeClr val="dk1"/>
+          </a:fontRef>
+        </p:style>
+        <p:txBody>
+          <a:bodyPr rtlCol="0" anchor="ctr"/>
+          <a:lstStyle/>
+          <a:p>
+            <a:pPr algn="ctr"/>
+            <a:endParaRPr lang="en-US"/>
+          </a:p>
+        </p:txBody>
+      </p:sp>
+      <p:cxnSp>
+        <p:nvCxnSpPr>
+          <p:cNvPr id="107" name="Connecteur droit avec flèche 106"/>
+          <p:cNvCxnSpPr>
+            <a:stCxn id="103" idx="1"/>
+            <a:endCxn id="26" idx="3"/>
+          </p:cNvCxnSpPr>
+          <p:nvPr/>
+        </p:nvCxnSpPr>
+        <p:spPr>
+          <a:xfrm rot="10800000" flipV="1">
+            <a:off x="9166554" y="1954082"/>
+            <a:ext cx="140970" cy="409575"/>
+          </a:xfrm>
+          <a:prstGeom prst="straightConnector1">
+            <a:avLst/>
+          </a:prstGeom>
+          <a:ln w="38100">
+            <a:solidFill>
+              <a:schemeClr val="tx1"/>
+            </a:solidFill>
+            <a:headEnd type="none" w="med" len="med"/>
+            <a:tailEnd type="triangle" w="med" len="med"/>
+          </a:ln>
+        </p:spPr>
+        <p:style>
+          <a:lnRef idx="3">
+            <a:schemeClr val="dk1"/>
+          </a:lnRef>
+          <a:fillRef idx="0">
+            <a:schemeClr val="dk1"/>
+          </a:fillRef>
+          <a:effectRef idx="2">
+            <a:schemeClr val="dk1"/>
+          </a:effectRef>
+          <a:fontRef idx="minor">
+            <a:schemeClr val="tx1"/>
+          </a:fontRef>
+        </p:style>
+      </p:cxnSp>
+      <p:cxnSp>
+        <p:nvCxnSpPr>
+          <p:cNvPr id="110" name="Connecteur droit avec flèche 109"/>
+          <p:cNvCxnSpPr>
+            <a:stCxn id="19" idx="1"/>
+            <a:endCxn id="25" idx="3"/>
+          </p:cNvCxnSpPr>
+          <p:nvPr/>
+        </p:nvCxnSpPr>
+        <p:spPr>
+          <a:xfrm rot="10800000">
+            <a:off x="9111582" y="3864073"/>
+            <a:ext cx="361950" cy="228600"/>
+          </a:xfrm>
+          <a:prstGeom prst="straightConnector1">
+            <a:avLst/>
+          </a:prstGeom>
+          <a:ln w="38100">
+            <a:solidFill>
+              <a:schemeClr val="tx1"/>
+            </a:solidFill>
+            <a:headEnd type="none" w="med" len="med"/>
+            <a:tailEnd type="triangle" w="med" len="med"/>
+          </a:ln>
+        </p:spPr>
+        <p:style>
+          <a:lnRef idx="3">
+            <a:schemeClr val="dk1"/>
+          </a:lnRef>
+          <a:fillRef idx="0">
+            <a:schemeClr val="dk1"/>
+          </a:fillRef>
+          <a:effectRef idx="2">
+            <a:schemeClr val="dk1"/>
+          </a:effectRef>
+          <a:fontRef idx="minor">
+            <a:schemeClr val="tx1"/>
+          </a:fontRef>
+        </p:style>
+      </p:cxnSp>
+      <p:sp>
+        <p:nvSpPr>
+          <p:cNvPr id="158" name="Rectangle 157"/>
+          <p:cNvSpPr/>
+          <p:nvPr/>
+        </p:nvSpPr>
+        <p:spPr>
+          <a:xfrm>
+            <a:off x="8202624" y="3224718"/>
+            <a:ext cx="1097280" cy="182880"/>
+          </a:xfrm>
+          <a:prstGeom prst="rect">
+            <a:avLst/>
+          </a:prstGeom>
+        </p:spPr>
+        <p:style>
+          <a:lnRef idx="2">
+            <a:schemeClr val="accent1"/>
+          </a:lnRef>
+          <a:fillRef idx="1">
+            <a:schemeClr val="lt1"/>
+          </a:fillRef>
+          <a:effectRef idx="0">
+            <a:schemeClr val="accent1"/>
+          </a:effectRef>
+          <a:fontRef idx="minor">
+            <a:schemeClr val="dk1"/>
+          </a:fontRef>
+        </p:style>
+        <p:txBody>
+          <a:bodyPr rtlCol="0" anchor="ctr"/>
+          <a:lstStyle/>
+          <a:p>
+            <a:r>
+              <a:rPr lang="en-US" sz="800" dirty="0" smtClean="0"/>
+              <a:t>ENG_MATH</a:t>
+            </a:r>
+            <a:endParaRPr lang="en-US" sz="800" dirty="0"/>
+          </a:p>
+        </p:txBody>
+      </p:sp>
+      <p:cxnSp>
+        <p:nvCxnSpPr>
+          <p:cNvPr id="364" name="Connecteur droit avec flèche 363"/>
+          <p:cNvCxnSpPr>
+            <a:stCxn id="19" idx="1"/>
+            <a:endCxn id="341" idx="3"/>
+          </p:cNvCxnSpPr>
+          <p:nvPr/>
+        </p:nvCxnSpPr>
+        <p:spPr>
+          <a:xfrm rot="10800000" flipV="1">
+            <a:off x="7635208" y="4092673"/>
+            <a:ext cx="1838325" cy="590550"/>
+          </a:xfrm>
+          <a:prstGeom prst="straightConnector1">
+            <a:avLst/>
+          </a:prstGeom>
+          <a:ln w="38100">
+            <a:solidFill>
+              <a:schemeClr val="tx1"/>
+            </a:solidFill>
+            <a:headEnd type="none" w="med" len="med"/>
+            <a:tailEnd type="triangle" w="med" len="med"/>
+          </a:ln>
+        </p:spPr>
+        <p:style>
+          <a:lnRef idx="3">
+            <a:schemeClr val="dk1"/>
+          </a:lnRef>
+          <a:fillRef idx="0">
+            <a:schemeClr val="dk1"/>
+          </a:fillRef>
+          <a:effectRef idx="2">
+            <a:schemeClr val="dk1"/>
+          </a:effectRef>
+          <a:fontRef idx="minor">
+            <a:schemeClr val="tx1"/>
+          </a:fontRef>
+        </p:style>
+      </p:cxnSp>
+      <p:cxnSp>
+        <p:nvCxnSpPr>
+          <p:cNvPr id="408" name="Connecteur droit avec flèche 407"/>
+          <p:cNvCxnSpPr>
+            <a:stCxn id="19" idx="1"/>
+            <a:endCxn id="158" idx="3"/>
+          </p:cNvCxnSpPr>
+          <p:nvPr/>
+        </p:nvCxnSpPr>
+        <p:spPr>
+          <a:xfrm rot="10800000">
+            <a:off x="9299904" y="3316159"/>
+            <a:ext cx="173628" cy="776515"/>
+          </a:xfrm>
+          <a:prstGeom prst="straightConnector1">
+            <a:avLst/>
+          </a:prstGeom>
+          <a:ln w="38100">
+            <a:solidFill>
+              <a:schemeClr val="tx1"/>
+            </a:solidFill>
+            <a:headEnd type="none" w="med" len="med"/>
+            <a:tailEnd type="triangle" w="med" len="med"/>
+          </a:ln>
+        </p:spPr>
+        <p:style>
+          <a:lnRef idx="3">
+            <a:schemeClr val="dk1"/>
+          </a:lnRef>
+          <a:fillRef idx="0">
+            <a:schemeClr val="dk1"/>
+          </a:fillRef>
+          <a:effectRef idx="2">
+            <a:schemeClr val="dk1"/>
+          </a:effectRef>
+          <a:fontRef idx="minor">
+            <a:schemeClr val="tx1"/>
+          </a:fontRef>
+        </p:style>
+      </p:cxnSp>
+      <p:sp>
+        <p:nvSpPr>
+          <p:cNvPr id="4" name="Hexagone 3"/>
+          <p:cNvSpPr/>
+          <p:nvPr/>
+        </p:nvSpPr>
+        <p:spPr>
+          <a:xfrm>
+            <a:off x="6276975" y="2286000"/>
+            <a:ext cx="1733550" cy="1504949"/>
+          </a:xfrm>
+          <a:prstGeom prst="hexagon">
+            <a:avLst/>
+          </a:prstGeom>
+          <a:solidFill>
+            <a:schemeClr val="accent4"/>
+          </a:solidFill>
+        </p:spPr>
+        <p:style>
+          <a:lnRef idx="1">
+            <a:schemeClr val="accent4"/>
+          </a:lnRef>
+          <a:fillRef idx="3">
+            <a:schemeClr val="accent4"/>
+          </a:fillRef>
+          <a:effectRef idx="2">
+            <a:schemeClr val="accent4"/>
+          </a:effectRef>
+          <a:fontRef idx="minor">
+            <a:schemeClr val="lt1"/>
+          </a:fontRef>
+        </p:style>
+        <p:txBody>
+          <a:bodyPr rtlCol="0" anchor="ctr"/>
+          <a:lstStyle/>
+          <a:p>
+            <a:pPr algn="ctr"/>
+            <a:endParaRPr lang="en-US"/>
+          </a:p>
+        </p:txBody>
+      </p:sp>
+      <p:sp>
+        <p:nvSpPr>
+          <p:cNvPr id="28" name="Rectangle 27"/>
+          <p:cNvSpPr/>
+          <p:nvPr/>
+        </p:nvSpPr>
+        <p:spPr>
+          <a:xfrm>
+            <a:off x="6623480" y="2639683"/>
+            <a:ext cx="1097280" cy="182880"/>
+          </a:xfrm>
+          <a:prstGeom prst="rect">
+            <a:avLst/>
+          </a:prstGeom>
+        </p:spPr>
+        <p:style>
+          <a:lnRef idx="2">
+            <a:schemeClr val="accent1"/>
+          </a:lnRef>
+          <a:fillRef idx="1">
+            <a:schemeClr val="lt1"/>
+          </a:fillRef>
+          <a:effectRef idx="0">
+            <a:schemeClr val="accent1"/>
+          </a:effectRef>
+          <a:fontRef idx="minor">
+            <a:schemeClr val="dk1"/>
+          </a:fontRef>
+        </p:style>
+        <p:txBody>
+          <a:bodyPr rtlCol="0" anchor="ctr"/>
+          <a:lstStyle/>
+          <a:p>
+            <a:r>
+              <a:rPr lang="en-US" sz="800" dirty="0" smtClean="0"/>
+              <a:t>GAM_SCREEN_LVL_1</a:t>
+            </a:r>
+            <a:endParaRPr lang="en-US" sz="800" dirty="0"/>
+          </a:p>
+        </p:txBody>
+      </p:sp>
+      <p:sp>
+        <p:nvSpPr>
+          <p:cNvPr id="30" name="Rectangle 29"/>
+          <p:cNvSpPr/>
+          <p:nvPr/>
+        </p:nvSpPr>
+        <p:spPr>
+          <a:xfrm>
+            <a:off x="6623480" y="3068308"/>
+            <a:ext cx="1097280" cy="182880"/>
+          </a:xfrm>
+          <a:prstGeom prst="rect">
+            <a:avLst/>
+          </a:prstGeom>
+        </p:spPr>
+        <p:style>
+          <a:lnRef idx="2">
+            <a:schemeClr val="accent1"/>
+          </a:lnRef>
+          <a:fillRef idx="1">
+            <a:schemeClr val="lt1"/>
+          </a:fillRef>
+          <a:effectRef idx="0">
+            <a:schemeClr val="accent1"/>
+          </a:effectRef>
+          <a:fontRef idx="minor">
+            <a:schemeClr val="dk1"/>
+          </a:fontRef>
+        </p:style>
+        <p:txBody>
+          <a:bodyPr rtlCol="0" anchor="ctr"/>
+          <a:lstStyle/>
+          <a:p>
+            <a:r>
+              <a:rPr lang="en-US" sz="800" dirty="0" smtClean="0"/>
+              <a:t>GAM_SCREEN_MENU</a:t>
+            </a:r>
+            <a:endParaRPr lang="en-US" sz="800" dirty="0"/>
+          </a:p>
+        </p:txBody>
+      </p:sp>
+      <p:cxnSp>
+        <p:nvCxnSpPr>
+          <p:cNvPr id="60" name="Connecteur droit avec flèche 59"/>
+          <p:cNvCxnSpPr>
+            <a:stCxn id="28" idx="1"/>
+            <a:endCxn id="24" idx="3"/>
+          </p:cNvCxnSpPr>
+          <p:nvPr/>
+        </p:nvCxnSpPr>
+        <p:spPr>
+          <a:xfrm rot="10800000">
+            <a:off x="6183324" y="2658933"/>
+            <a:ext cx="440156" cy="72190"/>
+          </a:xfrm>
+          <a:prstGeom prst="straightConnector1">
+            <a:avLst/>
+          </a:prstGeom>
+          <a:ln w="38100">
+            <a:solidFill>
+              <a:schemeClr val="tx1"/>
+            </a:solidFill>
+            <a:headEnd type="none" w="med" len="med"/>
+            <a:tailEnd type="triangle" w="med" len="med"/>
+          </a:ln>
+        </p:spPr>
+        <p:style>
+          <a:lnRef idx="3">
+            <a:schemeClr val="dk1"/>
+          </a:lnRef>
+          <a:fillRef idx="0">
+            <a:schemeClr val="dk1"/>
+          </a:fillRef>
+          <a:effectRef idx="2">
+            <a:schemeClr val="dk1"/>
+          </a:effectRef>
+          <a:fontRef idx="minor">
+            <a:schemeClr val="tx1"/>
+          </a:fontRef>
+        </p:style>
+      </p:cxnSp>
+      <p:cxnSp>
+        <p:nvCxnSpPr>
+          <p:cNvPr id="63" name="Connecteur droit avec flèche 62"/>
+          <p:cNvCxnSpPr>
+            <a:stCxn id="28" idx="1"/>
+            <a:endCxn id="27" idx="3"/>
+          </p:cNvCxnSpPr>
+          <p:nvPr/>
+        </p:nvCxnSpPr>
+        <p:spPr>
+          <a:xfrm rot="10800000" flipV="1">
+            <a:off x="6183324" y="2731122"/>
+            <a:ext cx="440156" cy="165935"/>
+          </a:xfrm>
+          <a:prstGeom prst="straightConnector1">
+            <a:avLst/>
+          </a:prstGeom>
+          <a:ln w="38100">
+            <a:solidFill>
+              <a:schemeClr val="tx1"/>
+            </a:solidFill>
+            <a:headEnd type="none" w="med" len="med"/>
+            <a:tailEnd type="triangle" w="med" len="med"/>
+          </a:ln>
+        </p:spPr>
+        <p:style>
+          <a:lnRef idx="3">
+            <a:schemeClr val="dk1"/>
+          </a:lnRef>
+          <a:fillRef idx="0">
+            <a:schemeClr val="dk1"/>
+          </a:fillRef>
+          <a:effectRef idx="2">
+            <a:schemeClr val="dk1"/>
+          </a:effectRef>
+          <a:fontRef idx="minor">
+            <a:schemeClr val="tx1"/>
+          </a:fontRef>
+        </p:style>
+      </p:cxnSp>
+      <p:cxnSp>
+        <p:nvCxnSpPr>
+          <p:cNvPr id="69" name="Connecteur droit avec flèche 68"/>
+          <p:cNvCxnSpPr>
+            <a:stCxn id="28" idx="1"/>
+            <a:endCxn id="31" idx="3"/>
+          </p:cNvCxnSpPr>
+          <p:nvPr/>
+        </p:nvCxnSpPr>
+        <p:spPr>
+          <a:xfrm rot="10800000" flipV="1">
+            <a:off x="6173800" y="2731123"/>
+            <a:ext cx="449681" cy="766010"/>
+          </a:xfrm>
+          <a:prstGeom prst="straightConnector1">
+            <a:avLst/>
+          </a:prstGeom>
+          <a:ln w="38100">
+            <a:solidFill>
+              <a:schemeClr val="tx1"/>
+            </a:solidFill>
+            <a:headEnd type="none" w="med" len="med"/>
+            <a:tailEnd type="triangle" w="med" len="med"/>
+          </a:ln>
+        </p:spPr>
+        <p:style>
+          <a:lnRef idx="3">
+            <a:schemeClr val="dk1"/>
+          </a:lnRef>
+          <a:fillRef idx="0">
+            <a:schemeClr val="dk1"/>
+          </a:fillRef>
+          <a:effectRef idx="2">
+            <a:schemeClr val="dk1"/>
+          </a:effectRef>
+          <a:fontRef idx="minor">
+            <a:schemeClr val="tx1"/>
+          </a:fontRef>
+        </p:style>
+      </p:cxnSp>
+      <p:cxnSp>
+        <p:nvCxnSpPr>
+          <p:cNvPr id="72" name="Connecteur droit avec flèche 71"/>
+          <p:cNvCxnSpPr>
+            <a:stCxn id="28" idx="1"/>
+            <a:endCxn id="21" idx="3"/>
+          </p:cNvCxnSpPr>
+          <p:nvPr/>
+        </p:nvCxnSpPr>
+        <p:spPr>
+          <a:xfrm rot="10800000" flipV="1">
+            <a:off x="6173800" y="2731123"/>
+            <a:ext cx="449681" cy="537410"/>
+          </a:xfrm>
+          <a:prstGeom prst="straightConnector1">
+            <a:avLst/>
+          </a:prstGeom>
+          <a:ln w="38100">
+            <a:solidFill>
+              <a:schemeClr val="tx1"/>
+            </a:solidFill>
+            <a:headEnd type="none" w="med" len="med"/>
+            <a:tailEnd type="triangle" w="med" len="med"/>
+          </a:ln>
+        </p:spPr>
+        <p:style>
+          <a:lnRef idx="3">
+            <a:schemeClr val="dk1"/>
+          </a:lnRef>
+          <a:fillRef idx="0">
+            <a:schemeClr val="dk1"/>
+          </a:fillRef>
+          <a:effectRef idx="2">
+            <a:schemeClr val="dk1"/>
+          </a:effectRef>
+          <a:fontRef idx="minor">
+            <a:schemeClr val="tx1"/>
+          </a:fontRef>
+        </p:style>
+      </p:cxnSp>
+      <p:cxnSp>
+        <p:nvCxnSpPr>
+          <p:cNvPr id="75" name="Connecteur droit avec flèche 74"/>
+          <p:cNvCxnSpPr>
+            <a:stCxn id="30" idx="1"/>
+            <a:endCxn id="31" idx="3"/>
+          </p:cNvCxnSpPr>
+          <p:nvPr/>
+        </p:nvCxnSpPr>
+        <p:spPr>
+          <a:xfrm rot="10800000" flipV="1">
+            <a:off x="6173800" y="3159747"/>
+            <a:ext cx="449681" cy="337385"/>
+          </a:xfrm>
+          <a:prstGeom prst="straightConnector1">
+            <a:avLst/>
+          </a:prstGeom>
+          <a:ln w="38100">
+            <a:solidFill>
+              <a:schemeClr val="tx1"/>
+            </a:solidFill>
+            <a:headEnd type="none" w="med" len="med"/>
+            <a:tailEnd type="triangle" w="med" len="med"/>
+          </a:ln>
+        </p:spPr>
+        <p:style>
+          <a:lnRef idx="3">
+            <a:schemeClr val="dk1"/>
+          </a:lnRef>
+          <a:fillRef idx="0">
+            <a:schemeClr val="dk1"/>
+          </a:fillRef>
+          <a:effectRef idx="2">
+            <a:schemeClr val="dk1"/>
+          </a:effectRef>
+          <a:fontRef idx="minor">
+            <a:schemeClr val="tx1"/>
+          </a:fontRef>
+        </p:style>
+      </p:cxnSp>
+      <p:cxnSp>
+        <p:nvCxnSpPr>
+          <p:cNvPr id="78" name="Connecteur droit avec flèche 77"/>
+          <p:cNvCxnSpPr>
+            <a:stCxn id="30" idx="1"/>
+            <a:endCxn id="21" idx="3"/>
+          </p:cNvCxnSpPr>
+          <p:nvPr/>
+        </p:nvCxnSpPr>
+        <p:spPr>
+          <a:xfrm rot="10800000" flipV="1">
+            <a:off x="6173800" y="3159747"/>
+            <a:ext cx="449681" cy="108785"/>
+          </a:xfrm>
+          <a:prstGeom prst="straightConnector1">
+            <a:avLst/>
+          </a:prstGeom>
+          <a:ln w="38100">
+            <a:solidFill>
+              <a:schemeClr val="tx1"/>
+            </a:solidFill>
+            <a:headEnd type="none" w="med" len="med"/>
+            <a:tailEnd type="triangle" w="med" len="med"/>
+          </a:ln>
+        </p:spPr>
+        <p:style>
+          <a:lnRef idx="3">
+            <a:schemeClr val="dk1"/>
+          </a:lnRef>
+          <a:fillRef idx="0">
+            <a:schemeClr val="dk1"/>
+          </a:fillRef>
+          <a:effectRef idx="2">
+            <a:schemeClr val="dk1"/>
+          </a:effectRef>
+          <a:fontRef idx="minor">
+            <a:schemeClr val="tx1"/>
+          </a:fontRef>
+        </p:style>
+      </p:cxnSp>
+      <p:sp>
+        <p:nvSpPr>
+          <p:cNvPr id="102" name="Rectangle 101"/>
+          <p:cNvSpPr/>
+          <p:nvPr/>
+        </p:nvSpPr>
+        <p:spPr>
+          <a:xfrm>
+            <a:off x="5516574" y="1881693"/>
+            <a:ext cx="1097280" cy="182880"/>
+          </a:xfrm>
+          <a:prstGeom prst="rect">
+            <a:avLst/>
+          </a:prstGeom>
+        </p:spPr>
+        <p:style>
+          <a:lnRef idx="2">
+            <a:schemeClr val="accent1"/>
+          </a:lnRef>
+          <a:fillRef idx="1">
+            <a:schemeClr val="lt1"/>
+          </a:fillRef>
+          <a:effectRef idx="0">
+            <a:schemeClr val="accent1"/>
+          </a:effectRef>
+          <a:fontRef idx="minor">
+            <a:schemeClr val="dk1"/>
+          </a:fontRef>
+        </p:style>
+        <p:txBody>
+          <a:bodyPr rtlCol="0" anchor="ctr"/>
+          <a:lstStyle/>
+          <a:p>
+            <a:r>
+              <a:rPr lang="en-US" sz="800" dirty="0" smtClean="0"/>
+              <a:t>ENG_CLI_PHYSICS</a:t>
+            </a:r>
+            <a:endParaRPr lang="en-US" sz="800" dirty="0"/>
+          </a:p>
+        </p:txBody>
+      </p:sp>
+      <p:cxnSp>
+        <p:nvCxnSpPr>
+          <p:cNvPr id="104" name="Connecteur droit avec flèche 103"/>
+          <p:cNvCxnSpPr>
+            <a:stCxn id="28" idx="3"/>
+            <a:endCxn id="26" idx="1"/>
+          </p:cNvCxnSpPr>
+          <p:nvPr/>
+        </p:nvCxnSpPr>
+        <p:spPr>
+          <a:xfrm flipV="1">
+            <a:off x="7720760" y="2363658"/>
+            <a:ext cx="348514" cy="367465"/>
+          </a:xfrm>
+          <a:prstGeom prst="straightConnector1">
+            <a:avLst/>
+          </a:prstGeom>
+          <a:ln w="38100">
+            <a:solidFill>
+              <a:schemeClr val="tx1"/>
+            </a:solidFill>
+            <a:headEnd type="none" w="med" len="med"/>
+            <a:tailEnd type="triangle" w="med" len="med"/>
+          </a:ln>
+        </p:spPr>
+        <p:style>
+          <a:lnRef idx="3">
+            <a:schemeClr val="dk1"/>
+          </a:lnRef>
+          <a:fillRef idx="0">
+            <a:schemeClr val="dk1"/>
+          </a:fillRef>
+          <a:effectRef idx="2">
+            <a:schemeClr val="dk1"/>
+          </a:effectRef>
+          <a:fontRef idx="minor">
+            <a:schemeClr val="tx1"/>
+          </a:fontRef>
+        </p:style>
+      </p:cxnSp>
+      <p:cxnSp>
+        <p:nvCxnSpPr>
+          <p:cNvPr id="113" name="Connecteur droit avec flèche 112"/>
+          <p:cNvCxnSpPr>
+            <a:stCxn id="30" idx="3"/>
+            <a:endCxn id="25" idx="1"/>
+          </p:cNvCxnSpPr>
+          <p:nvPr/>
+        </p:nvCxnSpPr>
+        <p:spPr>
+          <a:xfrm>
+            <a:off x="7720760" y="3159748"/>
+            <a:ext cx="476422" cy="704325"/>
+          </a:xfrm>
+          <a:prstGeom prst="straightConnector1">
+            <a:avLst/>
+          </a:prstGeom>
+          <a:ln w="38100">
+            <a:solidFill>
+              <a:schemeClr val="tx1"/>
+            </a:solidFill>
+            <a:headEnd type="none" w="med" len="med"/>
+            <a:tailEnd type="triangle" w="med" len="med"/>
+          </a:ln>
+        </p:spPr>
+        <p:style>
+          <a:lnRef idx="3">
+            <a:schemeClr val="dk1"/>
+          </a:lnRef>
+          <a:fillRef idx="0">
+            <a:schemeClr val="dk1"/>
+          </a:fillRef>
+          <a:effectRef idx="2">
+            <a:schemeClr val="dk1"/>
+          </a:effectRef>
+          <a:fontRef idx="minor">
+            <a:schemeClr val="tx1"/>
+          </a:fontRef>
+        </p:style>
+      </p:cxnSp>
+      <p:cxnSp>
+        <p:nvCxnSpPr>
+          <p:cNvPr id="117" name="Connecteur droit avec flèche 116"/>
+          <p:cNvCxnSpPr>
+            <a:stCxn id="28" idx="1"/>
+            <a:endCxn id="102" idx="3"/>
+          </p:cNvCxnSpPr>
+          <p:nvPr/>
+        </p:nvCxnSpPr>
+        <p:spPr>
+          <a:xfrm rot="10800000">
+            <a:off x="6613854" y="1973133"/>
+            <a:ext cx="9626" cy="757990"/>
+          </a:xfrm>
+          <a:prstGeom prst="straightConnector1">
+            <a:avLst/>
+          </a:prstGeom>
+          <a:ln w="38100">
+            <a:solidFill>
+              <a:schemeClr val="tx1"/>
+            </a:solidFill>
+            <a:headEnd type="none" w="med" len="med"/>
+            <a:tailEnd type="triangle" w="med" len="med"/>
+          </a:ln>
+        </p:spPr>
+        <p:style>
+          <a:lnRef idx="3">
+            <a:schemeClr val="dk1"/>
+          </a:lnRef>
+          <a:fillRef idx="0">
+            <a:schemeClr val="dk1"/>
+          </a:fillRef>
+          <a:effectRef idx="2">
+            <a:schemeClr val="dk1"/>
+          </a:effectRef>
+          <a:fontRef idx="minor">
+            <a:schemeClr val="tx1"/>
+          </a:fontRef>
+        </p:style>
+      </p:cxnSp>
+      <p:cxnSp>
+        <p:nvCxnSpPr>
+          <p:cNvPr id="159" name="Connecteur droit avec flèche 158"/>
+          <p:cNvCxnSpPr>
+            <a:stCxn id="28" idx="3"/>
+            <a:endCxn id="158" idx="1"/>
+          </p:cNvCxnSpPr>
+          <p:nvPr/>
+        </p:nvCxnSpPr>
+        <p:spPr>
+          <a:xfrm>
+            <a:off x="7720760" y="2731123"/>
+            <a:ext cx="481864" cy="585035"/>
+          </a:xfrm>
+          <a:prstGeom prst="straightConnector1">
+            <a:avLst/>
+          </a:prstGeom>
+          <a:ln w="38100">
+            <a:solidFill>
+              <a:schemeClr val="tx1"/>
+            </a:solidFill>
+            <a:headEnd type="none" w="med" len="med"/>
+            <a:tailEnd type="triangle" w="med" len="med"/>
+          </a:ln>
+        </p:spPr>
+        <p:style>
+          <a:lnRef idx="3">
+            <a:schemeClr val="dk1"/>
+          </a:lnRef>
+          <a:fillRef idx="0">
+            <a:schemeClr val="dk1"/>
+          </a:fillRef>
+          <a:effectRef idx="2">
+            <a:schemeClr val="dk1"/>
+          </a:effectRef>
+          <a:fontRef idx="minor">
+            <a:schemeClr val="tx1"/>
+          </a:fontRef>
+        </p:style>
+      </p:cxnSp>
+      <p:cxnSp>
+        <p:nvCxnSpPr>
+          <p:cNvPr id="172" name="Connecteur droit avec flèche 171"/>
+          <p:cNvCxnSpPr>
+            <a:stCxn id="28" idx="3"/>
+            <a:endCxn id="25" idx="1"/>
+          </p:cNvCxnSpPr>
+          <p:nvPr/>
+        </p:nvCxnSpPr>
+        <p:spPr>
+          <a:xfrm>
+            <a:off x="7720760" y="2731123"/>
+            <a:ext cx="476422" cy="1132950"/>
+          </a:xfrm>
+          <a:prstGeom prst="straightConnector1">
+            <a:avLst/>
+          </a:prstGeom>
+          <a:ln w="38100">
+            <a:solidFill>
+              <a:schemeClr val="tx1"/>
+            </a:solidFill>
+            <a:headEnd type="none" w="med" len="med"/>
+            <a:tailEnd type="triangle" w="med" len="med"/>
+          </a:ln>
+        </p:spPr>
+        <p:style>
+          <a:lnRef idx="3">
+            <a:schemeClr val="dk1"/>
+          </a:lnRef>
+          <a:fillRef idx="0">
+            <a:schemeClr val="dk1"/>
+          </a:fillRef>
+          <a:effectRef idx="2">
+            <a:schemeClr val="dk1"/>
+          </a:effectRef>
+          <a:fontRef idx="minor">
+            <a:schemeClr val="tx1"/>
+          </a:fontRef>
+        </p:style>
+      </p:cxnSp>
+      <p:sp>
+        <p:nvSpPr>
+          <p:cNvPr id="338" name="Rectangle 337"/>
+          <p:cNvSpPr/>
+          <p:nvPr/>
+        </p:nvSpPr>
+        <p:spPr>
+          <a:xfrm>
+            <a:off x="6601915" y="520184"/>
+            <a:ext cx="1189428" cy="369332"/>
+          </a:xfrm>
+          <a:prstGeom prst="rect">
+            <a:avLst/>
+          </a:prstGeom>
+        </p:spPr>
+        <p:txBody>
+          <a:bodyPr wrap="none">
+            <a:spAutoFit/>
+          </a:bodyPr>
+          <a:lstStyle/>
+          <a:p>
+            <a:r>
+              <a:rPr lang="en-US" b="1" dirty="0" smtClean="0">
+                <a:solidFill>
+                  <a:schemeClr val="bg1"/>
+                </a:solidFill>
+              </a:rPr>
+              <a:t>ADAPTERS</a:t>
+            </a:r>
+            <a:endParaRPr lang="en-US" b="1" dirty="0">
+              <a:solidFill>
+                <a:schemeClr val="bg1"/>
+              </a:solidFill>
+            </a:endParaRPr>
+          </a:p>
+        </p:txBody>
+      </p:sp>
+      <p:sp>
+        <p:nvSpPr>
+          <p:cNvPr id="339" name="Rectangle 338"/>
+          <p:cNvSpPr/>
+          <p:nvPr/>
+        </p:nvSpPr>
+        <p:spPr>
+          <a:xfrm>
+            <a:off x="6763840" y="1491734"/>
+            <a:ext cx="812851" cy="369332"/>
+          </a:xfrm>
+          <a:prstGeom prst="rect">
+            <a:avLst/>
+          </a:prstGeom>
+        </p:spPr>
+        <p:txBody>
+          <a:bodyPr wrap="none">
+            <a:spAutoFit/>
+          </a:bodyPr>
+          <a:lstStyle/>
+          <a:p>
+            <a:r>
+              <a:rPr lang="en-US" b="1" dirty="0" smtClean="0">
+                <a:solidFill>
+                  <a:schemeClr val="bg1"/>
+                </a:solidFill>
+              </a:rPr>
+              <a:t>PORTS</a:t>
+            </a:r>
+            <a:endParaRPr lang="en-US" b="1" dirty="0">
+              <a:solidFill>
+                <a:schemeClr val="bg1"/>
+              </a:solidFill>
+            </a:endParaRPr>
+          </a:p>
+        </p:txBody>
+      </p:sp>
+      <p:sp>
+        <p:nvSpPr>
+          <p:cNvPr id="340" name="Rectangle 339"/>
+          <p:cNvSpPr/>
+          <p:nvPr/>
+        </p:nvSpPr>
+        <p:spPr>
+          <a:xfrm>
+            <a:off x="6801940" y="2244209"/>
+            <a:ext cx="702372" cy="369332"/>
+          </a:xfrm>
+          <a:prstGeom prst="rect">
+            <a:avLst/>
+          </a:prstGeom>
+        </p:spPr>
+        <p:txBody>
+          <a:bodyPr wrap="none">
+            <a:spAutoFit/>
+          </a:bodyPr>
+          <a:lstStyle/>
+          <a:p>
+            <a:r>
+              <a:rPr lang="en-US" b="1" dirty="0" smtClean="0">
+                <a:solidFill>
+                  <a:schemeClr val="bg1"/>
+                </a:solidFill>
+              </a:rPr>
+              <a:t>CORE</a:t>
+            </a:r>
+            <a:endParaRPr lang="en-US" b="1" dirty="0">
+              <a:solidFill>
+                <a:schemeClr val="bg1"/>
+              </a:solidFill>
+            </a:endParaRPr>
+          </a:p>
+        </p:txBody>
+      </p:sp>
+      <p:sp>
+        <p:nvSpPr>
+          <p:cNvPr id="341" name="Rectangle 340"/>
+          <p:cNvSpPr/>
+          <p:nvPr/>
+        </p:nvSpPr>
+        <p:spPr>
+          <a:xfrm>
+            <a:off x="6720807" y="4591783"/>
+            <a:ext cx="914400" cy="182880"/>
+          </a:xfrm>
+          <a:prstGeom prst="rect">
+            <a:avLst/>
+          </a:prstGeom>
+        </p:spPr>
+        <p:style>
+          <a:lnRef idx="2">
+            <a:schemeClr val="accent1"/>
+          </a:lnRef>
+          <a:fillRef idx="1">
+            <a:schemeClr val="lt1"/>
+          </a:fillRef>
+          <a:effectRef idx="0">
+            <a:schemeClr val="accent1"/>
+          </a:effectRef>
+          <a:fontRef idx="minor">
+            <a:schemeClr val="dk1"/>
+          </a:fontRef>
+        </p:style>
+        <p:txBody>
+          <a:bodyPr rtlCol="0" anchor="ctr"/>
+          <a:lstStyle/>
+          <a:p>
+            <a:r>
+              <a:rPr lang="en-US" sz="800" dirty="0" smtClean="0"/>
+              <a:t>ENG_CONFIG</a:t>
+            </a:r>
+            <a:endParaRPr lang="en-US" sz="800" dirty="0"/>
+          </a:p>
+        </p:txBody>
+      </p:sp>
+      <p:cxnSp>
+        <p:nvCxnSpPr>
+          <p:cNvPr id="342" name="Connecteur droit avec flèche 341"/>
+          <p:cNvCxnSpPr>
+            <a:stCxn id="504" idx="2"/>
+            <a:endCxn id="341" idx="0"/>
+          </p:cNvCxnSpPr>
+          <p:nvPr/>
+        </p:nvCxnSpPr>
+        <p:spPr>
+          <a:xfrm rot="16200000" flipH="1">
+            <a:off x="6690503" y="4104279"/>
+            <a:ext cx="969120" cy="5887"/>
+          </a:xfrm>
+          <a:prstGeom prst="straightConnector1">
+            <a:avLst/>
+          </a:prstGeom>
+          <a:ln w="38100">
+            <a:solidFill>
+              <a:schemeClr val="tx1"/>
+            </a:solidFill>
+            <a:headEnd type="none" w="med" len="med"/>
+            <a:tailEnd type="triangle" w="med" len="med"/>
+          </a:ln>
+        </p:spPr>
+        <p:style>
+          <a:lnRef idx="3">
+            <a:schemeClr val="dk1"/>
+          </a:lnRef>
+          <a:fillRef idx="0">
+            <a:schemeClr val="dk1"/>
+          </a:fillRef>
+          <a:effectRef idx="2">
+            <a:schemeClr val="dk1"/>
+          </a:effectRef>
+          <a:fontRef idx="minor">
+            <a:schemeClr val="tx1"/>
+          </a:fontRef>
+        </p:style>
+      </p:cxnSp>
+      <p:sp>
+        <p:nvSpPr>
+          <p:cNvPr id="504" name="Rectangle 503"/>
+          <p:cNvSpPr/>
+          <p:nvPr/>
+        </p:nvSpPr>
+        <p:spPr>
+          <a:xfrm>
+            <a:off x="6623480" y="3439783"/>
+            <a:ext cx="1097280" cy="182880"/>
+          </a:xfrm>
+          <a:prstGeom prst="rect">
+            <a:avLst/>
+          </a:prstGeom>
+        </p:spPr>
+        <p:style>
+          <a:lnRef idx="2">
+            <a:schemeClr val="accent1"/>
+          </a:lnRef>
+          <a:fillRef idx="1">
+            <a:schemeClr val="lt1"/>
+          </a:fillRef>
+          <a:effectRef idx="0">
+            <a:schemeClr val="accent1"/>
+          </a:effectRef>
+          <a:fontRef idx="minor">
+            <a:schemeClr val="dk1"/>
+          </a:fontRef>
+        </p:style>
+        <p:txBody>
+          <a:bodyPr rtlCol="0" anchor="ctr"/>
+          <a:lstStyle/>
+          <a:p>
+            <a:r>
+              <a:rPr lang="en-US" sz="800" dirty="0" smtClean="0"/>
+              <a:t>GAM_CONFIG</a:t>
+            </a:r>
+            <a:endParaRPr lang="en-US" sz="800" dirty="0"/>
+          </a:p>
+        </p:txBody>
+      </p:sp>
+      <p:cxnSp>
+        <p:nvCxnSpPr>
+          <p:cNvPr id="510" name="Connecteur droit avec flèche 509"/>
+          <p:cNvCxnSpPr>
+            <a:stCxn id="30" idx="2"/>
+            <a:endCxn id="504" idx="0"/>
+          </p:cNvCxnSpPr>
+          <p:nvPr/>
+        </p:nvCxnSpPr>
+        <p:spPr>
+          <a:xfrm rot="5400000">
+            <a:off x="7077823" y="3345485"/>
+            <a:ext cx="188595" cy="1588"/>
+          </a:xfrm>
+          <a:prstGeom prst="straightConnector1">
+            <a:avLst/>
+          </a:prstGeom>
+          <a:ln w="38100">
+            <a:solidFill>
+              <a:schemeClr val="tx1"/>
+            </a:solidFill>
+            <a:headEnd type="none" w="med" len="med"/>
+            <a:tailEnd type="triangle" w="med" len="med"/>
+          </a:ln>
+        </p:spPr>
+        <p:style>
+          <a:lnRef idx="3">
+            <a:schemeClr val="dk1"/>
+          </a:lnRef>
+          <a:fillRef idx="0">
+            <a:schemeClr val="dk1"/>
+          </a:fillRef>
+          <a:effectRef idx="2">
+            <a:schemeClr val="dk1"/>
+          </a:effectRef>
+          <a:fontRef idx="minor">
+            <a:schemeClr val="tx1"/>
+          </a:fontRef>
+        </p:style>
+      </p:cxnSp>
+      <p:cxnSp>
+        <p:nvCxnSpPr>
+          <p:cNvPr id="513" name="Connecteur droit avec flèche 512"/>
+          <p:cNvCxnSpPr>
+            <a:stCxn id="30" idx="0"/>
+            <a:endCxn id="28" idx="2"/>
+          </p:cNvCxnSpPr>
+          <p:nvPr/>
+        </p:nvCxnSpPr>
+        <p:spPr>
+          <a:xfrm rot="5400000" flipH="1" flipV="1">
+            <a:off x="7049248" y="2945436"/>
+            <a:ext cx="245745" cy="1588"/>
+          </a:xfrm>
+          <a:prstGeom prst="straightConnector1">
+            <a:avLst/>
+          </a:prstGeom>
+          <a:ln w="38100">
+            <a:solidFill>
+              <a:schemeClr val="tx1"/>
+            </a:solidFill>
+            <a:headEnd type="none" w="med" len="med"/>
+            <a:tailEnd type="triangle" w="med" len="med"/>
+          </a:ln>
+        </p:spPr>
+        <p:style>
+          <a:lnRef idx="3">
+            <a:schemeClr val="dk1"/>
+          </a:lnRef>
+          <a:fillRef idx="0">
+            <a:schemeClr val="dk1"/>
+          </a:fillRef>
+          <a:effectRef idx="2">
+            <a:schemeClr val="dk1"/>
+          </a:effectRef>
+          <a:fontRef idx="minor">
+            <a:schemeClr val="tx1"/>
+          </a:fontRef>
+        </p:style>
+      </p:cxnSp>
+      <p:cxnSp>
+        <p:nvCxnSpPr>
+          <p:cNvPr id="66" name="Connecteur droit avec flèche 65"/>
+          <p:cNvCxnSpPr>
+            <a:stCxn id="18" idx="3"/>
+            <a:endCxn id="92" idx="1"/>
+          </p:cNvCxnSpPr>
+          <p:nvPr/>
+        </p:nvCxnSpPr>
+        <p:spPr>
+          <a:xfrm flipV="1">
+            <a:off x="4857988" y="3076575"/>
+            <a:ext cx="314087" cy="937628"/>
+          </a:xfrm>
+          <a:prstGeom prst="straightConnector1">
+            <a:avLst/>
+          </a:prstGeom>
+          <a:ln w="38100">
+            <a:solidFill>
+              <a:schemeClr val="tx1"/>
+            </a:solidFill>
+            <a:headEnd type="none" w="med" len="med"/>
+            <a:tailEnd type="triangle" w="med" len="med"/>
+          </a:ln>
+        </p:spPr>
+        <p:style>
+          <a:lnRef idx="3">
+            <a:schemeClr val="dk1"/>
+          </a:lnRef>
+          <a:fillRef idx="0">
+            <a:schemeClr val="dk1"/>
+          </a:fillRef>
+          <a:effectRef idx="2">
+            <a:schemeClr val="dk1"/>
+          </a:effectRef>
+          <a:fontRef idx="minor">
+            <a:schemeClr val="tx1"/>
+          </a:fontRef>
+        </p:style>
+      </p:cxnSp>
+      <p:cxnSp>
+        <p:nvCxnSpPr>
+          <p:cNvPr id="96" name="Connecteur droit avec flèche 95"/>
+          <p:cNvCxnSpPr>
+            <a:stCxn id="10" idx="3"/>
+            <a:endCxn id="92" idx="1"/>
+          </p:cNvCxnSpPr>
+          <p:nvPr/>
+        </p:nvCxnSpPr>
+        <p:spPr>
+          <a:xfrm flipV="1">
+            <a:off x="4904252" y="3076575"/>
+            <a:ext cx="267823" cy="1462411"/>
+          </a:xfrm>
+          <a:prstGeom prst="straightConnector1">
+            <a:avLst/>
+          </a:prstGeom>
+          <a:ln w="38100">
+            <a:solidFill>
+              <a:schemeClr val="tx1"/>
+            </a:solidFill>
+            <a:headEnd type="none" w="med" len="med"/>
+            <a:tailEnd type="triangle" w="med" len="med"/>
+          </a:ln>
+        </p:spPr>
+        <p:style>
+          <a:lnRef idx="3">
+            <a:schemeClr val="dk1"/>
+          </a:lnRef>
+          <a:fillRef idx="0">
+            <a:schemeClr val="dk1"/>
+          </a:fillRef>
+          <a:effectRef idx="2">
+            <a:schemeClr val="dk1"/>
+          </a:effectRef>
+          <a:fontRef idx="minor">
+            <a:schemeClr val="tx1"/>
+          </a:fontRef>
+        </p:style>
+      </p:cxnSp>
+      <p:cxnSp>
+        <p:nvCxnSpPr>
+          <p:cNvPr id="99" name="Connecteur droit avec flèche 98"/>
+          <p:cNvCxnSpPr>
+            <a:stCxn id="13" idx="3"/>
+            <a:endCxn id="92" idx="1"/>
+          </p:cNvCxnSpPr>
+          <p:nvPr/>
+        </p:nvCxnSpPr>
+        <p:spPr>
+          <a:xfrm flipV="1">
+            <a:off x="4710125" y="3076575"/>
+            <a:ext cx="461950" cy="42736"/>
+          </a:xfrm>
+          <a:prstGeom prst="straightConnector1">
+            <a:avLst/>
+          </a:prstGeom>
+          <a:ln w="38100">
+            <a:solidFill>
+              <a:schemeClr val="tx1"/>
+            </a:solidFill>
+            <a:headEnd type="none" w="med" len="med"/>
+            <a:tailEnd type="triangle" w="med" len="med"/>
+          </a:ln>
+        </p:spPr>
+        <p:style>
+          <a:lnRef idx="3">
+            <a:schemeClr val="dk1"/>
+          </a:lnRef>
+          <a:fillRef idx="0">
+            <a:schemeClr val="dk1"/>
+          </a:fillRef>
+          <a:effectRef idx="2">
+            <a:schemeClr val="dk1"/>
+          </a:effectRef>
+          <a:fontRef idx="minor">
+            <a:schemeClr val="tx1"/>
+          </a:fontRef>
+        </p:style>
+      </p:cxnSp>
+      <p:cxnSp>
+        <p:nvCxnSpPr>
+          <p:cNvPr id="132" name="Connecteur droit avec flèche 131"/>
+          <p:cNvCxnSpPr>
+            <a:stCxn id="12" idx="3"/>
+            <a:endCxn id="92" idx="1"/>
+          </p:cNvCxnSpPr>
+          <p:nvPr/>
+        </p:nvCxnSpPr>
+        <p:spPr>
+          <a:xfrm>
+            <a:off x="4851637" y="2174069"/>
+            <a:ext cx="320438" cy="902506"/>
+          </a:xfrm>
+          <a:prstGeom prst="straightConnector1">
+            <a:avLst/>
+          </a:prstGeom>
+          <a:ln w="38100">
+            <a:solidFill>
+              <a:schemeClr val="tx1"/>
+            </a:solidFill>
+            <a:headEnd type="none" w="med" len="med"/>
+            <a:tailEnd type="triangle" w="med" len="med"/>
+          </a:ln>
+        </p:spPr>
+        <p:style>
+          <a:lnRef idx="3">
+            <a:schemeClr val="dk1"/>
+          </a:lnRef>
+          <a:fillRef idx="0">
+            <a:schemeClr val="dk1"/>
+          </a:fillRef>
+          <a:effectRef idx="2">
+            <a:schemeClr val="dk1"/>
+          </a:effectRef>
+          <a:fontRef idx="minor">
+            <a:schemeClr val="tx1"/>
+          </a:fontRef>
+        </p:style>
+      </p:cxnSp>
+      <p:cxnSp>
+        <p:nvCxnSpPr>
+          <p:cNvPr id="136" name="Connecteur droit avec flèche 135"/>
+          <p:cNvCxnSpPr>
+            <a:stCxn id="11" idx="3"/>
+            <a:endCxn id="92" idx="1"/>
+          </p:cNvCxnSpPr>
+          <p:nvPr/>
+        </p:nvCxnSpPr>
+        <p:spPr>
+          <a:xfrm>
+            <a:off x="4941446" y="1610735"/>
+            <a:ext cx="230629" cy="1465840"/>
+          </a:xfrm>
+          <a:prstGeom prst="straightConnector1">
+            <a:avLst/>
+          </a:prstGeom>
+          <a:ln w="38100">
+            <a:solidFill>
+              <a:schemeClr val="tx1"/>
+            </a:solidFill>
+            <a:headEnd type="none" w="med" len="med"/>
+            <a:tailEnd type="triangle" w="med" len="med"/>
+          </a:ln>
+        </p:spPr>
+        <p:style>
+          <a:lnRef idx="3">
+            <a:schemeClr val="dk1"/>
+          </a:lnRef>
+          <a:fillRef idx="0">
+            <a:schemeClr val="dk1"/>
+          </a:fillRef>
+          <a:effectRef idx="2">
+            <a:schemeClr val="dk1"/>
+          </a:effectRef>
+          <a:fontRef idx="minor">
+            <a:schemeClr val="tx1"/>
+          </a:fontRef>
+        </p:style>
+      </p:cxnSp>
+      <p:sp>
+        <p:nvSpPr>
+          <p:cNvPr id="257" name="Hexagone 256"/>
+          <p:cNvSpPr/>
+          <p:nvPr/>
+        </p:nvSpPr>
+        <p:spPr>
+          <a:xfrm>
+            <a:off x="2009775" y="5425390"/>
+            <a:ext cx="1371600" cy="1188720"/>
+          </a:xfrm>
+          <a:prstGeom prst="hexagon">
+            <a:avLst/>
+          </a:prstGeom>
+          <a:solidFill>
+            <a:schemeClr val="accent1"/>
+          </a:solidFill>
+        </p:spPr>
+        <p:style>
+          <a:lnRef idx="1">
+            <a:schemeClr val="accent5"/>
+          </a:lnRef>
+          <a:fillRef idx="3">
+            <a:schemeClr val="accent5"/>
+          </a:fillRef>
+          <a:effectRef idx="2">
+            <a:schemeClr val="accent5"/>
+          </a:effectRef>
+          <a:fontRef idx="minor">
+            <a:schemeClr val="lt1"/>
+          </a:fontRef>
+        </p:style>
+        <p:txBody>
+          <a:bodyPr rtlCol="0" anchor="t"/>
+          <a:lstStyle/>
+          <a:p>
+            <a:pPr algn="ctr"/>
+            <a:r>
+              <a:rPr lang="en-US" sz="1000" b="1" dirty="0" smtClean="0"/>
+              <a:t>game_raylib5</a:t>
+            </a:r>
+            <a:endParaRPr lang="en-US" sz="1000" b="1" dirty="0"/>
+          </a:p>
+        </p:txBody>
+      </p:sp>
+      <p:sp>
+        <p:nvSpPr>
+          <p:cNvPr id="211" name="Hexagone 210"/>
+          <p:cNvSpPr/>
+          <p:nvPr/>
+        </p:nvSpPr>
+        <p:spPr>
+          <a:xfrm>
+            <a:off x="933450" y="3162300"/>
+            <a:ext cx="828676" cy="704850"/>
+          </a:xfrm>
+          <a:prstGeom prst="hexagon">
+            <a:avLst/>
+          </a:prstGeom>
+          <a:solidFill>
+            <a:schemeClr val="accent1"/>
+          </a:solidFill>
+        </p:spPr>
+        <p:style>
+          <a:lnRef idx="1">
+            <a:schemeClr val="accent5"/>
+          </a:lnRef>
+          <a:fillRef idx="3">
+            <a:schemeClr val="accent5"/>
+          </a:fillRef>
+          <a:effectRef idx="2">
+            <a:schemeClr val="accent5"/>
+          </a:effectRef>
+          <a:fontRef idx="minor">
+            <a:schemeClr val="lt1"/>
+          </a:fontRef>
+        </p:style>
+        <p:txBody>
+          <a:bodyPr rtlCol="0" anchor="ctr"/>
+          <a:lstStyle/>
+          <a:p>
+            <a:pPr algn="ctr"/>
+            <a:endParaRPr lang="en-US" dirty="0"/>
+          </a:p>
+        </p:txBody>
+      </p:sp>
+      <p:sp>
+        <p:nvSpPr>
+          <p:cNvPr id="212" name="Hexagone 211"/>
+          <p:cNvSpPr/>
+          <p:nvPr/>
+        </p:nvSpPr>
+        <p:spPr>
+          <a:xfrm>
+            <a:off x="971550" y="1924050"/>
+            <a:ext cx="828676" cy="704850"/>
+          </a:xfrm>
+          <a:prstGeom prst="hexagon">
+            <a:avLst/>
+          </a:prstGeom>
+          <a:solidFill>
+            <a:schemeClr val="accent1"/>
+          </a:solidFill>
+        </p:spPr>
+        <p:style>
+          <a:lnRef idx="1">
+            <a:schemeClr val="accent5"/>
+          </a:lnRef>
+          <a:fillRef idx="3">
+            <a:schemeClr val="accent5"/>
+          </a:fillRef>
+          <a:effectRef idx="2">
+            <a:schemeClr val="accent5"/>
+          </a:effectRef>
+          <a:fontRef idx="minor">
+            <a:schemeClr val="lt1"/>
+          </a:fontRef>
+        </p:style>
+        <p:txBody>
+          <a:bodyPr rtlCol="0" anchor="ctr"/>
+          <a:lstStyle/>
+          <a:p>
+            <a:pPr algn="ctr"/>
+            <a:endParaRPr lang="en-US" dirty="0"/>
+          </a:p>
+        </p:txBody>
+      </p:sp>
+      <p:sp>
+        <p:nvSpPr>
+          <p:cNvPr id="213" name="Hexagone 212"/>
+          <p:cNvSpPr/>
+          <p:nvPr/>
+        </p:nvSpPr>
+        <p:spPr>
+          <a:xfrm>
+            <a:off x="1152525" y="847725"/>
+            <a:ext cx="828676" cy="704850"/>
+          </a:xfrm>
+          <a:prstGeom prst="hexagon">
+            <a:avLst/>
+          </a:prstGeom>
+          <a:solidFill>
+            <a:schemeClr val="accent1"/>
+          </a:solidFill>
+        </p:spPr>
+        <p:style>
+          <a:lnRef idx="1">
+            <a:schemeClr val="accent5"/>
+          </a:lnRef>
+          <a:fillRef idx="3">
+            <a:schemeClr val="accent5"/>
+          </a:fillRef>
+          <a:effectRef idx="2">
+            <a:schemeClr val="accent5"/>
+          </a:effectRef>
+          <a:fontRef idx="minor">
+            <a:schemeClr val="lt1"/>
+          </a:fontRef>
+        </p:style>
+        <p:txBody>
+          <a:bodyPr rtlCol="0" anchor="ctr"/>
+          <a:lstStyle/>
+          <a:p>
+            <a:pPr algn="ctr"/>
+            <a:endParaRPr lang="en-US" dirty="0"/>
+          </a:p>
+        </p:txBody>
+      </p:sp>
+      <p:sp>
+        <p:nvSpPr>
+          <p:cNvPr id="210" name="Hexagone 209"/>
+          <p:cNvSpPr/>
+          <p:nvPr/>
+        </p:nvSpPr>
+        <p:spPr>
+          <a:xfrm>
+            <a:off x="971550" y="4381500"/>
+            <a:ext cx="828676" cy="704850"/>
+          </a:xfrm>
+          <a:prstGeom prst="hexagon">
+            <a:avLst/>
+          </a:prstGeom>
+          <a:solidFill>
+            <a:schemeClr val="accent1"/>
+          </a:solidFill>
+        </p:spPr>
+        <p:style>
+          <a:lnRef idx="1">
+            <a:schemeClr val="accent5"/>
+          </a:lnRef>
+          <a:fillRef idx="3">
+            <a:schemeClr val="accent5"/>
+          </a:fillRef>
+          <a:effectRef idx="2">
+            <a:schemeClr val="accent5"/>
+          </a:effectRef>
+          <a:fontRef idx="minor">
+            <a:schemeClr val="lt1"/>
+          </a:fontRef>
+        </p:style>
+        <p:txBody>
+          <a:bodyPr rtlCol="0" anchor="ctr"/>
+          <a:lstStyle/>
+          <a:p>
+            <a:pPr algn="ctr"/>
+            <a:endParaRPr lang="en-US" dirty="0"/>
+          </a:p>
+        </p:txBody>
+      </p:sp>
+      <p:sp>
+        <p:nvSpPr>
+          <p:cNvPr id="34" name="Hexagone 33"/>
+          <p:cNvSpPr/>
+          <p:nvPr/>
+        </p:nvSpPr>
+        <p:spPr>
+          <a:xfrm>
+            <a:off x="2105025" y="1691590"/>
+            <a:ext cx="1400175" cy="1165910"/>
+          </a:xfrm>
+          <a:prstGeom prst="hexagon">
+            <a:avLst/>
+          </a:prstGeom>
+          <a:solidFill>
+            <a:schemeClr val="accent1"/>
+          </a:solidFill>
+        </p:spPr>
+        <p:style>
+          <a:lnRef idx="1">
+            <a:schemeClr val="accent5"/>
+          </a:lnRef>
+          <a:fillRef idx="3">
+            <a:schemeClr val="accent5"/>
+          </a:fillRef>
+          <a:effectRef idx="2">
+            <a:schemeClr val="accent5"/>
+          </a:effectRef>
+          <a:fontRef idx="minor">
+            <a:schemeClr val="lt1"/>
+          </a:fontRef>
+        </p:style>
+        <p:txBody>
+          <a:bodyPr rtlCol="0" anchor="t"/>
+          <a:lstStyle/>
+          <a:p>
+            <a:pPr algn="ctr"/>
+            <a:r>
+              <a:rPr lang="en-US" sz="1000" b="1" dirty="0" smtClean="0"/>
+              <a:t>game_unity6</a:t>
+            </a:r>
+            <a:endParaRPr lang="en-US" sz="1000" b="1" dirty="0"/>
+          </a:p>
+        </p:txBody>
+      </p:sp>
+      <p:sp>
+        <p:nvSpPr>
+          <p:cNvPr id="35" name="Hexagone 34"/>
+          <p:cNvSpPr/>
+          <p:nvPr/>
+        </p:nvSpPr>
+        <p:spPr>
+          <a:xfrm>
+            <a:off x="1943100" y="2929840"/>
+            <a:ext cx="1400175" cy="1165910"/>
+          </a:xfrm>
+          <a:prstGeom prst="hexagon">
+            <a:avLst/>
+          </a:prstGeom>
+          <a:solidFill>
+            <a:schemeClr val="accent1"/>
+          </a:solidFill>
+        </p:spPr>
+        <p:style>
+          <a:lnRef idx="1">
+            <a:schemeClr val="accent5"/>
+          </a:lnRef>
+          <a:fillRef idx="3">
+            <a:schemeClr val="accent5"/>
+          </a:fillRef>
+          <a:effectRef idx="2">
+            <a:schemeClr val="accent5"/>
+          </a:effectRef>
+          <a:fontRef idx="minor">
+            <a:schemeClr val="lt1"/>
+          </a:fontRef>
+        </p:style>
+        <p:txBody>
+          <a:bodyPr rtlCol="0" anchor="t"/>
+          <a:lstStyle/>
+          <a:p>
+            <a:pPr algn="ctr"/>
+            <a:r>
+              <a:rPr lang="en-US" sz="1000" b="1" dirty="0" smtClean="0"/>
+              <a:t>game_godot4</a:t>
+            </a:r>
+            <a:endParaRPr lang="en-US" sz="1000" b="1" dirty="0"/>
+          </a:p>
+        </p:txBody>
+      </p:sp>
+      <p:sp>
+        <p:nvSpPr>
+          <p:cNvPr id="36" name="Hexagone 35"/>
+          <p:cNvSpPr/>
+          <p:nvPr/>
+        </p:nvSpPr>
+        <p:spPr>
+          <a:xfrm>
+            <a:off x="1981200" y="4177615"/>
+            <a:ext cx="1400175" cy="1165910"/>
+          </a:xfrm>
+          <a:prstGeom prst="hexagon">
+            <a:avLst/>
+          </a:prstGeom>
+          <a:solidFill>
+            <a:schemeClr val="accent1"/>
+          </a:solidFill>
+        </p:spPr>
+        <p:style>
+          <a:lnRef idx="1">
+            <a:schemeClr val="accent5"/>
+          </a:lnRef>
+          <a:fillRef idx="3">
+            <a:schemeClr val="accent5"/>
+          </a:fillRef>
+          <a:effectRef idx="2">
+            <a:schemeClr val="accent5"/>
+          </a:effectRef>
+          <a:fontRef idx="minor">
+            <a:schemeClr val="lt1"/>
+          </a:fontRef>
+        </p:style>
+        <p:txBody>
+          <a:bodyPr rtlCol="0" anchor="t"/>
+          <a:lstStyle/>
+          <a:p>
+            <a:pPr algn="ctr"/>
+            <a:r>
+              <a:rPr lang="en-US" sz="1000" b="1" dirty="0" smtClean="0"/>
+              <a:t>game_defold1</a:t>
+            </a:r>
+            <a:endParaRPr lang="en-US" sz="1000" b="1" dirty="0"/>
+          </a:p>
+        </p:txBody>
+      </p:sp>
+      <p:sp>
+        <p:nvSpPr>
+          <p:cNvPr id="37" name="Hexagone 36"/>
+          <p:cNvSpPr/>
+          <p:nvPr/>
+        </p:nvSpPr>
+        <p:spPr>
+          <a:xfrm>
+            <a:off x="3581400" y="4939615"/>
+            <a:ext cx="1371600" cy="1188720"/>
+          </a:xfrm>
+          <a:prstGeom prst="hexagon">
+            <a:avLst/>
+          </a:prstGeom>
+          <a:solidFill>
+            <a:schemeClr val="accent1"/>
+          </a:solidFill>
+        </p:spPr>
+        <p:style>
+          <a:lnRef idx="1">
+            <a:schemeClr val="accent5"/>
+          </a:lnRef>
+          <a:fillRef idx="3">
+            <a:schemeClr val="accent5"/>
+          </a:fillRef>
+          <a:effectRef idx="2">
+            <a:schemeClr val="accent5"/>
+          </a:effectRef>
+          <a:fontRef idx="minor">
+            <a:schemeClr val="lt1"/>
+          </a:fontRef>
+        </p:style>
+        <p:txBody>
+          <a:bodyPr rtlCol="0" anchor="ctr"/>
+          <a:lstStyle/>
+          <a:p>
+            <a:pPr algn="ctr"/>
+            <a:endParaRPr lang="en-US" dirty="0"/>
+          </a:p>
+        </p:txBody>
+      </p:sp>
+      <p:sp>
+        <p:nvSpPr>
+          <p:cNvPr id="32" name="Hexagone 31"/>
+          <p:cNvSpPr/>
+          <p:nvPr/>
+        </p:nvSpPr>
+        <p:spPr>
+          <a:xfrm>
+            <a:off x="2400300" y="472390"/>
+            <a:ext cx="1400175" cy="1165910"/>
+          </a:xfrm>
+          <a:prstGeom prst="hexagon">
+            <a:avLst/>
+          </a:prstGeom>
+          <a:solidFill>
+            <a:schemeClr val="accent1"/>
+          </a:solidFill>
+        </p:spPr>
+        <p:style>
+          <a:lnRef idx="1">
+            <a:schemeClr val="accent5"/>
+          </a:lnRef>
+          <a:fillRef idx="3">
+            <a:schemeClr val="accent5"/>
+          </a:fillRef>
+          <a:effectRef idx="2">
+            <a:schemeClr val="accent5"/>
+          </a:effectRef>
+          <a:fontRef idx="minor">
+            <a:schemeClr val="lt1"/>
+          </a:fontRef>
+        </p:style>
+        <p:txBody>
+          <a:bodyPr rtlCol="0" anchor="t"/>
+          <a:lstStyle/>
+          <a:p>
+            <a:pPr algn="ctr"/>
+            <a:r>
+              <a:rPr lang="en-US" sz="1000" b="1" dirty="0" smtClean="0"/>
+              <a:t>game_unreal5</a:t>
+            </a:r>
+            <a:endParaRPr lang="en-US" sz="1000" b="1" dirty="0"/>
+          </a:p>
+        </p:txBody>
+      </p:sp>
+      <p:sp>
+        <p:nvSpPr>
+          <p:cNvPr id="9" name="Rectangle 8"/>
+          <p:cNvSpPr/>
+          <p:nvPr/>
+        </p:nvSpPr>
+        <p:spPr>
+          <a:xfrm>
+            <a:off x="2226556" y="5904491"/>
+            <a:ext cx="914400" cy="182880"/>
+          </a:xfrm>
+          <a:prstGeom prst="rect">
+            <a:avLst/>
+          </a:prstGeom>
+        </p:spPr>
+        <p:style>
+          <a:lnRef idx="2">
+            <a:schemeClr val="accent1"/>
+          </a:lnRef>
+          <a:fillRef idx="1">
+            <a:schemeClr val="lt1"/>
+          </a:fillRef>
+          <a:effectRef idx="0">
+            <a:schemeClr val="accent1"/>
+          </a:effectRef>
+          <a:fontRef idx="minor">
+            <a:schemeClr val="dk1"/>
+          </a:fontRef>
+        </p:style>
+        <p:txBody>
+          <a:bodyPr rtlCol="0" anchor="ctr"/>
+          <a:lstStyle/>
+          <a:p>
+            <a:r>
+              <a:rPr lang="en-US" sz="800" dirty="0" smtClean="0"/>
+              <a:t>RAYLIB5_MAIN</a:t>
+            </a:r>
+            <a:endParaRPr lang="en-US" sz="800" dirty="0"/>
+          </a:p>
+        </p:txBody>
+      </p:sp>
+      <p:sp>
+        <p:nvSpPr>
+          <p:cNvPr id="12" name="Rectangle 11"/>
+          <p:cNvSpPr/>
+          <p:nvPr/>
+        </p:nvSpPr>
+        <p:spPr>
+          <a:xfrm>
+            <a:off x="3937237" y="2082629"/>
+            <a:ext cx="914400" cy="182880"/>
+          </a:xfrm>
+          <a:prstGeom prst="rect">
+            <a:avLst/>
+          </a:prstGeom>
+        </p:spPr>
+        <p:style>
+          <a:lnRef idx="2">
+            <a:schemeClr val="accent1"/>
+          </a:lnRef>
+          <a:fillRef idx="1">
+            <a:schemeClr val="lt1"/>
+          </a:fillRef>
+          <a:effectRef idx="0">
+            <a:schemeClr val="accent1"/>
+          </a:effectRef>
+          <a:fontRef idx="minor">
+            <a:schemeClr val="dk1"/>
+          </a:fontRef>
+        </p:style>
+        <p:txBody>
+          <a:bodyPr rtlCol="0" anchor="ctr"/>
+          <a:lstStyle/>
+          <a:p>
+            <a:r>
+              <a:rPr lang="en-US" sz="800" dirty="0" smtClean="0"/>
+              <a:t>ENG_UNITY6</a:t>
+            </a:r>
+            <a:endParaRPr lang="en-US" sz="800" dirty="0"/>
+          </a:p>
+        </p:txBody>
+      </p:sp>
+      <p:sp>
+        <p:nvSpPr>
+          <p:cNvPr id="13" name="Rectangle 12"/>
+          <p:cNvSpPr/>
+          <p:nvPr/>
+        </p:nvSpPr>
+        <p:spPr>
+          <a:xfrm>
+            <a:off x="3795725" y="3027871"/>
+            <a:ext cx="914400" cy="182880"/>
+          </a:xfrm>
+          <a:prstGeom prst="rect">
+            <a:avLst/>
+          </a:prstGeom>
+        </p:spPr>
+        <p:style>
+          <a:lnRef idx="2">
+            <a:schemeClr val="accent1"/>
+          </a:lnRef>
+          <a:fillRef idx="1">
+            <a:schemeClr val="lt1"/>
+          </a:fillRef>
+          <a:effectRef idx="0">
+            <a:schemeClr val="accent1"/>
+          </a:effectRef>
+          <a:fontRef idx="minor">
+            <a:schemeClr val="dk1"/>
+          </a:fontRef>
+        </p:style>
+        <p:txBody>
+          <a:bodyPr rtlCol="0" anchor="ctr"/>
+          <a:lstStyle/>
+          <a:p>
+            <a:r>
+              <a:rPr lang="en-US" sz="800" dirty="0" smtClean="0"/>
+              <a:t>ENG_GODOT4</a:t>
+            </a:r>
+            <a:endParaRPr lang="en-US" sz="800" dirty="0"/>
+          </a:p>
+        </p:txBody>
+      </p:sp>
+      <p:sp>
+        <p:nvSpPr>
+          <p:cNvPr id="14" name="Rectangle 13"/>
+          <p:cNvSpPr/>
+          <p:nvPr/>
+        </p:nvSpPr>
+        <p:spPr>
+          <a:xfrm>
+            <a:off x="2225008" y="3344459"/>
+            <a:ext cx="914400" cy="182880"/>
+          </a:xfrm>
+          <a:prstGeom prst="rect">
+            <a:avLst/>
+          </a:prstGeom>
+        </p:spPr>
+        <p:style>
+          <a:lnRef idx="2">
+            <a:schemeClr val="accent1"/>
+          </a:lnRef>
+          <a:fillRef idx="1">
+            <a:schemeClr val="lt1"/>
+          </a:fillRef>
+          <a:effectRef idx="0">
+            <a:schemeClr val="accent1"/>
+          </a:effectRef>
+          <a:fontRef idx="minor">
+            <a:schemeClr val="dk1"/>
+          </a:fontRef>
+        </p:style>
+        <p:txBody>
+          <a:bodyPr rtlCol="0" anchor="ctr"/>
+          <a:lstStyle/>
+          <a:p>
+            <a:r>
+              <a:rPr lang="en-US" sz="800" dirty="0" smtClean="0"/>
+              <a:t>GODOT4_SCRIPT</a:t>
+            </a:r>
+            <a:endParaRPr lang="en-US" sz="800" dirty="0"/>
+          </a:p>
+        </p:txBody>
+      </p:sp>
+      <p:sp>
+        <p:nvSpPr>
+          <p:cNvPr id="15" name="Rectangle 14"/>
+          <p:cNvSpPr/>
+          <p:nvPr/>
+        </p:nvSpPr>
+        <p:spPr>
+          <a:xfrm>
+            <a:off x="2389198" y="2108477"/>
+            <a:ext cx="914400" cy="182880"/>
+          </a:xfrm>
+          <a:prstGeom prst="rect">
+            <a:avLst/>
+          </a:prstGeom>
+        </p:spPr>
+        <p:style>
+          <a:lnRef idx="2">
+            <a:schemeClr val="accent1"/>
+          </a:lnRef>
+          <a:fillRef idx="1">
+            <a:schemeClr val="lt1"/>
+          </a:fillRef>
+          <a:effectRef idx="0">
+            <a:schemeClr val="accent1"/>
+          </a:effectRef>
+          <a:fontRef idx="minor">
+            <a:schemeClr val="dk1"/>
+          </a:fontRef>
+        </p:style>
+        <p:txBody>
+          <a:bodyPr rtlCol="0" anchor="ctr"/>
+          <a:lstStyle/>
+          <a:p>
+            <a:r>
+              <a:rPr lang="en-US" sz="800" dirty="0" smtClean="0"/>
+              <a:t>UNITY6_SCRIPT</a:t>
+            </a:r>
+            <a:endParaRPr lang="en-US" sz="800" dirty="0"/>
+          </a:p>
+        </p:txBody>
+      </p:sp>
+      <p:sp>
+        <p:nvSpPr>
+          <p:cNvPr id="16" name="Rectangle 15"/>
+          <p:cNvSpPr/>
+          <p:nvPr/>
+        </p:nvSpPr>
+        <p:spPr>
+          <a:xfrm>
+            <a:off x="2666786" y="892453"/>
+            <a:ext cx="914400" cy="182880"/>
+          </a:xfrm>
+          <a:prstGeom prst="rect">
+            <a:avLst/>
+          </a:prstGeom>
+        </p:spPr>
+        <p:style>
+          <a:lnRef idx="2">
+            <a:schemeClr val="accent1"/>
+          </a:lnRef>
+          <a:fillRef idx="1">
+            <a:schemeClr val="lt1"/>
+          </a:fillRef>
+          <a:effectRef idx="0">
+            <a:schemeClr val="accent1"/>
+          </a:effectRef>
+          <a:fontRef idx="minor">
+            <a:schemeClr val="dk1"/>
+          </a:fontRef>
+        </p:style>
+        <p:txBody>
+          <a:bodyPr rtlCol="0" anchor="ctr"/>
+          <a:lstStyle/>
+          <a:p>
+            <a:r>
+              <a:rPr lang="en-US" sz="800" dirty="0" smtClean="0"/>
+              <a:t>UNREAL5_SCRIPT</a:t>
+            </a:r>
+            <a:endParaRPr lang="en-US" sz="800" dirty="0"/>
+          </a:p>
+        </p:txBody>
+      </p:sp>
+      <p:sp>
+        <p:nvSpPr>
+          <p:cNvPr id="17" name="Rectangle 16"/>
+          <p:cNvSpPr/>
+          <p:nvPr/>
+        </p:nvSpPr>
+        <p:spPr>
+          <a:xfrm>
+            <a:off x="2257397" y="4608182"/>
+            <a:ext cx="914400" cy="182880"/>
+          </a:xfrm>
+          <a:prstGeom prst="rect">
+            <a:avLst/>
+          </a:prstGeom>
+        </p:spPr>
+        <p:style>
+          <a:lnRef idx="2">
+            <a:schemeClr val="accent1"/>
+          </a:lnRef>
+          <a:fillRef idx="1">
+            <a:schemeClr val="lt1"/>
+          </a:fillRef>
+          <a:effectRef idx="0">
+            <a:schemeClr val="accent1"/>
+          </a:effectRef>
+          <a:fontRef idx="minor">
+            <a:schemeClr val="dk1"/>
+          </a:fontRef>
+        </p:style>
+        <p:txBody>
+          <a:bodyPr rtlCol="0" anchor="ctr"/>
+          <a:lstStyle/>
+          <a:p>
+            <a:r>
+              <a:rPr lang="en-US" sz="800" dirty="0" smtClean="0"/>
+              <a:t>DEFOLD1_SCRIPT</a:t>
+            </a:r>
+            <a:endParaRPr lang="en-US" sz="800" dirty="0"/>
+          </a:p>
+        </p:txBody>
+      </p:sp>
+      <p:sp>
+        <p:nvSpPr>
+          <p:cNvPr id="18" name="Rectangle 17"/>
+          <p:cNvSpPr/>
+          <p:nvPr/>
+        </p:nvSpPr>
+        <p:spPr>
+          <a:xfrm>
+            <a:off x="3943588" y="3922763"/>
+            <a:ext cx="914400" cy="182880"/>
+          </a:xfrm>
+          <a:prstGeom prst="rect">
+            <a:avLst/>
+          </a:prstGeom>
+        </p:spPr>
+        <p:style>
+          <a:lnRef idx="2">
+            <a:schemeClr val="accent1"/>
+          </a:lnRef>
+          <a:fillRef idx="1">
+            <a:schemeClr val="lt1"/>
+          </a:fillRef>
+          <a:effectRef idx="0">
+            <a:schemeClr val="accent1"/>
+          </a:effectRef>
+          <a:fontRef idx="minor">
+            <a:schemeClr val="dk1"/>
+          </a:fontRef>
+        </p:style>
+        <p:txBody>
+          <a:bodyPr rtlCol="0" anchor="ctr"/>
+          <a:lstStyle/>
+          <a:p>
+            <a:r>
+              <a:rPr lang="en-US" sz="800" dirty="0" smtClean="0"/>
+              <a:t>ENG_DEFOLD1</a:t>
+            </a:r>
+            <a:endParaRPr lang="en-US" sz="800" dirty="0"/>
+          </a:p>
+        </p:txBody>
+      </p:sp>
+      <p:pic>
+        <p:nvPicPr>
+          <p:cNvPr id="33" name="Picture 2"/>
+          <p:cNvPicPr>
+            <a:picLocks noChangeAspect="1" noChangeArrowheads="1"/>
+          </p:cNvPicPr>
+          <p:nvPr/>
+        </p:nvPicPr>
+        <p:blipFill>
+          <a:blip r:embed="rId4" cstate="print"/>
+          <a:srcRect/>
+          <a:stretch>
+            <a:fillRect/>
+          </a:stretch>
+        </p:blipFill>
+        <p:spPr bwMode="auto">
+          <a:xfrm>
+            <a:off x="1358557" y="994573"/>
+            <a:ext cx="455518" cy="425371"/>
+          </a:xfrm>
+          <a:prstGeom prst="rect">
+            <a:avLst/>
+          </a:prstGeom>
+          <a:noFill/>
+          <a:ln w="9525">
+            <a:noFill/>
+            <a:miter lim="800000"/>
+            <a:headEnd/>
+            <a:tailEnd/>
+          </a:ln>
+          <a:effectLst/>
+        </p:spPr>
+      </p:pic>
+      <p:pic>
+        <p:nvPicPr>
+          <p:cNvPr id="38" name="Picture 3"/>
+          <p:cNvPicPr>
+            <a:picLocks noChangeAspect="1" noChangeArrowheads="1"/>
+          </p:cNvPicPr>
+          <p:nvPr/>
+        </p:nvPicPr>
+        <p:blipFill>
+          <a:blip r:embed="rId5" cstate="print"/>
+          <a:srcRect/>
+          <a:stretch>
+            <a:fillRect/>
+          </a:stretch>
+        </p:blipFill>
+        <p:spPr bwMode="auto">
+          <a:xfrm>
+            <a:off x="1164452" y="2039720"/>
+            <a:ext cx="401327" cy="454577"/>
+          </a:xfrm>
+          <a:prstGeom prst="rect">
+            <a:avLst/>
+          </a:prstGeom>
+          <a:noFill/>
+          <a:ln w="9525">
+            <a:noFill/>
+            <a:miter lim="800000"/>
+            <a:headEnd/>
+            <a:tailEnd/>
+          </a:ln>
+          <a:effectLst/>
+        </p:spPr>
+      </p:pic>
+      <p:pic>
+        <p:nvPicPr>
+          <p:cNvPr id="39" name="Picture 5"/>
+          <p:cNvPicPr>
+            <a:picLocks noChangeAspect="1" noChangeArrowheads="1"/>
+          </p:cNvPicPr>
+          <p:nvPr/>
+        </p:nvPicPr>
+        <p:blipFill>
+          <a:blip r:embed="rId6" cstate="print"/>
+          <a:srcRect/>
+          <a:stretch>
+            <a:fillRect/>
+          </a:stretch>
+        </p:blipFill>
+        <p:spPr bwMode="auto">
+          <a:xfrm>
+            <a:off x="1129442" y="3280959"/>
+            <a:ext cx="470329" cy="484276"/>
+          </a:xfrm>
+          <a:prstGeom prst="rect">
+            <a:avLst/>
+          </a:prstGeom>
+          <a:noFill/>
+          <a:ln w="9525">
+            <a:noFill/>
+            <a:miter lim="800000"/>
+            <a:headEnd/>
+            <a:tailEnd/>
+          </a:ln>
+          <a:effectLst/>
+        </p:spPr>
+      </p:pic>
+      <p:pic>
+        <p:nvPicPr>
+          <p:cNvPr id="40" name="Picture 6"/>
+          <p:cNvPicPr>
+            <a:picLocks noChangeAspect="1" noChangeArrowheads="1"/>
+          </p:cNvPicPr>
+          <p:nvPr/>
+        </p:nvPicPr>
+        <p:blipFill>
+          <a:blip r:embed="rId7" cstate="print"/>
+          <a:srcRect/>
+          <a:stretch>
+            <a:fillRect/>
+          </a:stretch>
+        </p:blipFill>
+        <p:spPr bwMode="auto">
+          <a:xfrm>
+            <a:off x="1133303" y="4496552"/>
+            <a:ext cx="530825" cy="469206"/>
+          </a:xfrm>
+          <a:prstGeom prst="rect">
+            <a:avLst/>
+          </a:prstGeom>
+          <a:noFill/>
+          <a:ln w="9525">
+            <a:noFill/>
+            <a:miter lim="800000"/>
+            <a:headEnd/>
+            <a:tailEnd/>
+          </a:ln>
+          <a:effectLst/>
+        </p:spPr>
+      </p:pic>
+      <p:cxnSp>
+        <p:nvCxnSpPr>
+          <p:cNvPr id="43" name="Connecteur droit avec flèche 42"/>
+          <p:cNvCxnSpPr>
+            <a:stCxn id="16" idx="3"/>
+            <a:endCxn id="11" idx="1"/>
+          </p:cNvCxnSpPr>
+          <p:nvPr/>
+        </p:nvCxnSpPr>
+        <p:spPr>
+          <a:xfrm>
+            <a:off x="3581186" y="983893"/>
+            <a:ext cx="445860" cy="626842"/>
+          </a:xfrm>
+          <a:prstGeom prst="straightConnector1">
+            <a:avLst/>
+          </a:prstGeom>
+          <a:ln w="38100">
+            <a:solidFill>
+              <a:schemeClr val="tx1"/>
+            </a:solidFill>
+            <a:headEnd type="none" w="med" len="med"/>
+            <a:tailEnd type="triangle" w="med" len="med"/>
+          </a:ln>
+        </p:spPr>
+        <p:style>
+          <a:lnRef idx="3">
+            <a:schemeClr val="dk1"/>
+          </a:lnRef>
+          <a:fillRef idx="0">
+            <a:schemeClr val="dk1"/>
+          </a:fillRef>
+          <a:effectRef idx="2">
+            <a:schemeClr val="dk1"/>
+          </a:effectRef>
+          <a:fontRef idx="minor">
+            <a:schemeClr val="tx1"/>
+          </a:fontRef>
+        </p:style>
+      </p:cxnSp>
+      <p:cxnSp>
+        <p:nvCxnSpPr>
+          <p:cNvPr id="45" name="Connecteur droit avec flèche 44"/>
+          <p:cNvCxnSpPr>
+            <a:stCxn id="15" idx="3"/>
+            <a:endCxn id="12" idx="1"/>
+          </p:cNvCxnSpPr>
+          <p:nvPr/>
+        </p:nvCxnSpPr>
+        <p:spPr>
+          <a:xfrm flipV="1">
+            <a:off x="3303598" y="2174069"/>
+            <a:ext cx="633639" cy="25848"/>
+          </a:xfrm>
+          <a:prstGeom prst="straightConnector1">
+            <a:avLst/>
+          </a:prstGeom>
+          <a:ln w="38100">
+            <a:solidFill>
+              <a:schemeClr val="tx1"/>
+            </a:solidFill>
+            <a:headEnd type="none" w="med" len="med"/>
+            <a:tailEnd type="triangle" w="med" len="med"/>
+          </a:ln>
+        </p:spPr>
+        <p:style>
+          <a:lnRef idx="3">
+            <a:schemeClr val="dk1"/>
+          </a:lnRef>
+          <a:fillRef idx="0">
+            <a:schemeClr val="dk1"/>
+          </a:fillRef>
+          <a:effectRef idx="2">
+            <a:schemeClr val="dk1"/>
+          </a:effectRef>
+          <a:fontRef idx="minor">
+            <a:schemeClr val="tx1"/>
+          </a:fontRef>
+        </p:style>
+      </p:cxnSp>
+      <p:cxnSp>
+        <p:nvCxnSpPr>
+          <p:cNvPr id="48" name="Connecteur droit avec flèche 47"/>
+          <p:cNvCxnSpPr>
+            <a:stCxn id="14" idx="3"/>
+            <a:endCxn id="13" idx="1"/>
+          </p:cNvCxnSpPr>
+          <p:nvPr/>
+        </p:nvCxnSpPr>
+        <p:spPr>
+          <a:xfrm flipV="1">
+            <a:off x="3139408" y="3119311"/>
+            <a:ext cx="656317" cy="316588"/>
+          </a:xfrm>
+          <a:prstGeom prst="straightConnector1">
+            <a:avLst/>
+          </a:prstGeom>
+          <a:ln w="38100">
+            <a:solidFill>
+              <a:schemeClr val="tx1"/>
+            </a:solidFill>
+            <a:headEnd type="none" w="med" len="med"/>
+            <a:tailEnd type="triangle" w="med" len="med"/>
+          </a:ln>
+        </p:spPr>
+        <p:style>
+          <a:lnRef idx="3">
+            <a:schemeClr val="dk1"/>
+          </a:lnRef>
+          <a:fillRef idx="0">
+            <a:schemeClr val="dk1"/>
+          </a:fillRef>
+          <a:effectRef idx="2">
+            <a:schemeClr val="dk1"/>
+          </a:effectRef>
+          <a:fontRef idx="minor">
+            <a:schemeClr val="tx1"/>
+          </a:fontRef>
+        </p:style>
+      </p:cxnSp>
+      <p:cxnSp>
+        <p:nvCxnSpPr>
+          <p:cNvPr id="51" name="Connecteur droit avec flèche 50"/>
+          <p:cNvCxnSpPr>
+            <a:stCxn id="17" idx="3"/>
+            <a:endCxn id="18" idx="1"/>
+          </p:cNvCxnSpPr>
+          <p:nvPr/>
+        </p:nvCxnSpPr>
+        <p:spPr>
+          <a:xfrm flipV="1">
+            <a:off x="3171797" y="4014203"/>
+            <a:ext cx="771791" cy="685419"/>
+          </a:xfrm>
+          <a:prstGeom prst="straightConnector1">
+            <a:avLst/>
+          </a:prstGeom>
+          <a:ln w="38100">
+            <a:solidFill>
+              <a:schemeClr val="tx1"/>
+            </a:solidFill>
+            <a:headEnd type="none" w="med" len="med"/>
+            <a:tailEnd type="triangle" w="med" len="med"/>
+          </a:ln>
+        </p:spPr>
+        <p:style>
+          <a:lnRef idx="3">
+            <a:schemeClr val="dk1"/>
+          </a:lnRef>
+          <a:fillRef idx="0">
+            <a:schemeClr val="dk1"/>
+          </a:fillRef>
+          <a:effectRef idx="2">
+            <a:schemeClr val="dk1"/>
+          </a:effectRef>
+          <a:fontRef idx="minor">
+            <a:schemeClr val="tx1"/>
+          </a:fontRef>
+        </p:style>
+      </p:cxnSp>
+      <p:cxnSp>
+        <p:nvCxnSpPr>
+          <p:cNvPr id="54" name="Connecteur droit avec flèche 53"/>
+          <p:cNvCxnSpPr>
+            <a:stCxn id="9" idx="3"/>
+            <a:endCxn id="10" idx="1"/>
+          </p:cNvCxnSpPr>
+          <p:nvPr/>
+        </p:nvCxnSpPr>
+        <p:spPr>
+          <a:xfrm flipV="1">
+            <a:off x="3140956" y="4538986"/>
+            <a:ext cx="848896" cy="1456945"/>
+          </a:xfrm>
+          <a:prstGeom prst="straightConnector1">
+            <a:avLst/>
+          </a:prstGeom>
+          <a:ln w="38100">
+            <a:solidFill>
+              <a:schemeClr val="tx1"/>
+            </a:solidFill>
+            <a:headEnd type="none" w="med" len="med"/>
+            <a:tailEnd type="triangle" w="med" len="med"/>
+          </a:ln>
+        </p:spPr>
+        <p:style>
+          <a:lnRef idx="3">
+            <a:schemeClr val="dk1"/>
+          </a:lnRef>
+          <a:fillRef idx="0">
+            <a:schemeClr val="dk1"/>
+          </a:fillRef>
+          <a:effectRef idx="2">
+            <a:schemeClr val="dk1"/>
+          </a:effectRef>
+          <a:fontRef idx="minor">
+            <a:schemeClr val="tx1"/>
+          </a:fontRef>
+        </p:style>
+      </p:cxnSp>
+      <p:sp>
+        <p:nvSpPr>
+          <p:cNvPr id="181" name="Rectangle 180"/>
+          <p:cNvSpPr/>
+          <p:nvPr/>
+        </p:nvSpPr>
+        <p:spPr>
+          <a:xfrm>
+            <a:off x="3807706" y="5542541"/>
+            <a:ext cx="914400" cy="182880"/>
+          </a:xfrm>
+          <a:prstGeom prst="rect">
+            <a:avLst/>
+          </a:prstGeom>
+        </p:spPr>
+        <p:style>
+          <a:lnRef idx="2">
+            <a:schemeClr val="accent1"/>
+          </a:lnRef>
+          <a:fillRef idx="1">
+            <a:schemeClr val="lt1"/>
+          </a:fillRef>
+          <a:effectRef idx="0">
+            <a:schemeClr val="accent1"/>
+          </a:effectRef>
+          <a:fontRef idx="minor">
+            <a:schemeClr val="dk1"/>
+          </a:fontRef>
+        </p:style>
+        <p:txBody>
+          <a:bodyPr rtlCol="0" anchor="ctr"/>
+          <a:lstStyle/>
+          <a:p>
+            <a:r>
+              <a:rPr lang="en-US" sz="800" dirty="0" smtClean="0"/>
+              <a:t>RAYLIB HEADER</a:t>
+            </a:r>
+          </a:p>
+        </p:txBody>
+      </p:sp>
+      <p:pic>
+        <p:nvPicPr>
+          <p:cNvPr id="184" name="Picture 8"/>
+          <p:cNvPicPr>
+            <a:picLocks noChangeAspect="1" noChangeArrowheads="1"/>
+          </p:cNvPicPr>
+          <p:nvPr/>
+        </p:nvPicPr>
+        <p:blipFill>
+          <a:blip r:embed="rId8" cstate="print"/>
+          <a:srcRect/>
+          <a:stretch>
+            <a:fillRect/>
+          </a:stretch>
+        </p:blipFill>
+        <p:spPr bwMode="auto">
+          <a:xfrm>
+            <a:off x="4049669" y="5097974"/>
+            <a:ext cx="395707" cy="404126"/>
+          </a:xfrm>
+          <a:prstGeom prst="rect">
+            <a:avLst/>
+          </a:prstGeom>
+          <a:noFill/>
+          <a:ln w="9525">
+            <a:noFill/>
+            <a:miter lim="800000"/>
+            <a:headEnd/>
+            <a:tailEnd/>
+          </a:ln>
+          <a:effectLst/>
+        </p:spPr>
+      </p:pic>
+      <p:sp>
+        <p:nvSpPr>
+          <p:cNvPr id="191" name="Rectangle 190"/>
+          <p:cNvSpPr/>
+          <p:nvPr/>
+        </p:nvSpPr>
+        <p:spPr>
+          <a:xfrm>
+            <a:off x="3807706" y="5761616"/>
+            <a:ext cx="914400" cy="182880"/>
+          </a:xfrm>
+          <a:prstGeom prst="rect">
+            <a:avLst/>
+          </a:prstGeom>
+        </p:spPr>
+        <p:style>
+          <a:lnRef idx="2">
+            <a:schemeClr val="accent1"/>
+          </a:lnRef>
+          <a:fillRef idx="1">
+            <a:schemeClr val="lt1"/>
+          </a:fillRef>
+          <a:effectRef idx="0">
+            <a:schemeClr val="accent1"/>
+          </a:effectRef>
+          <a:fontRef idx="minor">
+            <a:schemeClr val="dk1"/>
+          </a:fontRef>
+        </p:style>
+        <p:txBody>
+          <a:bodyPr rtlCol="0" anchor="ctr"/>
+          <a:lstStyle/>
+          <a:p>
+            <a:r>
+              <a:rPr lang="en-US" sz="800" dirty="0" smtClean="0"/>
+              <a:t>RAYLIB DLL</a:t>
+            </a:r>
+          </a:p>
+        </p:txBody>
+      </p:sp>
+      <p:cxnSp>
+        <p:nvCxnSpPr>
+          <p:cNvPr id="216" name="Connecteur droit avec flèche 215"/>
+          <p:cNvCxnSpPr>
+            <a:stCxn id="211" idx="0"/>
+            <a:endCxn id="35" idx="3"/>
+          </p:cNvCxnSpPr>
+          <p:nvPr/>
+        </p:nvCxnSpPr>
+        <p:spPr>
+          <a:xfrm flipV="1">
+            <a:off x="1762126" y="3512795"/>
+            <a:ext cx="180974" cy="1930"/>
+          </a:xfrm>
+          <a:prstGeom prst="straightConnector1">
+            <a:avLst/>
+          </a:prstGeom>
+          <a:ln w="38100">
+            <a:solidFill>
+              <a:schemeClr val="tx1"/>
+            </a:solidFill>
+            <a:headEnd type="none" w="med" len="med"/>
+            <a:tailEnd type="triangle" w="med" len="med"/>
+          </a:ln>
+        </p:spPr>
+        <p:style>
+          <a:lnRef idx="3">
+            <a:schemeClr val="dk1"/>
+          </a:lnRef>
+          <a:fillRef idx="0">
+            <a:schemeClr val="dk1"/>
+          </a:fillRef>
+          <a:effectRef idx="2">
+            <a:schemeClr val="dk1"/>
+          </a:effectRef>
+          <a:fontRef idx="minor">
+            <a:schemeClr val="tx1"/>
+          </a:fontRef>
+        </p:style>
+      </p:cxnSp>
+      <p:sp>
+        <p:nvSpPr>
+          <p:cNvPr id="224" name="Rectangle 223"/>
+          <p:cNvSpPr/>
+          <p:nvPr/>
+        </p:nvSpPr>
+        <p:spPr>
+          <a:xfrm>
+            <a:off x="2226556" y="6152141"/>
+            <a:ext cx="914400" cy="182880"/>
+          </a:xfrm>
+          <a:prstGeom prst="rect">
+            <a:avLst/>
+          </a:prstGeom>
+        </p:spPr>
+        <p:style>
+          <a:lnRef idx="2">
+            <a:schemeClr val="accent1"/>
+          </a:lnRef>
+          <a:fillRef idx="1">
+            <a:schemeClr val="lt1"/>
+          </a:fillRef>
+          <a:effectRef idx="0">
+            <a:schemeClr val="accent1"/>
+          </a:effectRef>
+          <a:fontRef idx="minor">
+            <a:schemeClr val="dk1"/>
+          </a:fontRef>
+        </p:style>
+        <p:txBody>
+          <a:bodyPr rtlCol="0" anchor="ctr"/>
+          <a:lstStyle/>
+          <a:p>
+            <a:r>
+              <a:rPr lang="en-US" sz="800" dirty="0" smtClean="0"/>
+              <a:t>ASSETS</a:t>
+            </a:r>
+            <a:endParaRPr lang="en-US" sz="800" dirty="0"/>
+          </a:p>
+        </p:txBody>
+      </p:sp>
+      <p:sp>
+        <p:nvSpPr>
+          <p:cNvPr id="225" name="Rectangle 224"/>
+          <p:cNvSpPr/>
+          <p:nvPr/>
+        </p:nvSpPr>
+        <p:spPr>
+          <a:xfrm>
+            <a:off x="2255131" y="4847216"/>
+            <a:ext cx="914400" cy="182880"/>
+          </a:xfrm>
+          <a:prstGeom prst="rect">
+            <a:avLst/>
+          </a:prstGeom>
+        </p:spPr>
+        <p:style>
+          <a:lnRef idx="2">
+            <a:schemeClr val="accent1"/>
+          </a:lnRef>
+          <a:fillRef idx="1">
+            <a:schemeClr val="lt1"/>
+          </a:fillRef>
+          <a:effectRef idx="0">
+            <a:schemeClr val="accent1"/>
+          </a:effectRef>
+          <a:fontRef idx="minor">
+            <a:schemeClr val="dk1"/>
+          </a:fontRef>
+        </p:style>
+        <p:txBody>
+          <a:bodyPr rtlCol="0" anchor="ctr"/>
+          <a:lstStyle/>
+          <a:p>
+            <a:r>
+              <a:rPr lang="en-US" sz="800" dirty="0" smtClean="0"/>
+              <a:t>ASSETS</a:t>
+            </a:r>
+            <a:endParaRPr lang="en-US" sz="800" dirty="0"/>
+          </a:p>
+        </p:txBody>
+      </p:sp>
+      <p:sp>
+        <p:nvSpPr>
+          <p:cNvPr id="226" name="Rectangle 225"/>
+          <p:cNvSpPr/>
+          <p:nvPr/>
+        </p:nvSpPr>
+        <p:spPr>
+          <a:xfrm>
+            <a:off x="2226556" y="3570866"/>
+            <a:ext cx="914400" cy="182880"/>
+          </a:xfrm>
+          <a:prstGeom prst="rect">
+            <a:avLst/>
+          </a:prstGeom>
+        </p:spPr>
+        <p:style>
+          <a:lnRef idx="2">
+            <a:schemeClr val="accent1"/>
+          </a:lnRef>
+          <a:fillRef idx="1">
+            <a:schemeClr val="lt1"/>
+          </a:fillRef>
+          <a:effectRef idx="0">
+            <a:schemeClr val="accent1"/>
+          </a:effectRef>
+          <a:fontRef idx="minor">
+            <a:schemeClr val="dk1"/>
+          </a:fontRef>
+        </p:style>
+        <p:txBody>
+          <a:bodyPr rtlCol="0" anchor="ctr"/>
+          <a:lstStyle/>
+          <a:p>
+            <a:r>
+              <a:rPr lang="en-US" sz="800" dirty="0" smtClean="0"/>
+              <a:t>ASSETS</a:t>
+            </a:r>
+            <a:endParaRPr lang="en-US" sz="800" dirty="0"/>
+          </a:p>
+        </p:txBody>
+      </p:sp>
+      <p:sp>
+        <p:nvSpPr>
+          <p:cNvPr id="227" name="Rectangle 226"/>
+          <p:cNvSpPr/>
+          <p:nvPr/>
+        </p:nvSpPr>
+        <p:spPr>
+          <a:xfrm>
+            <a:off x="2398006" y="2361191"/>
+            <a:ext cx="914400" cy="182880"/>
+          </a:xfrm>
+          <a:prstGeom prst="rect">
+            <a:avLst/>
+          </a:prstGeom>
+        </p:spPr>
+        <p:style>
+          <a:lnRef idx="2">
+            <a:schemeClr val="accent1"/>
+          </a:lnRef>
+          <a:fillRef idx="1">
+            <a:schemeClr val="lt1"/>
+          </a:fillRef>
+          <a:effectRef idx="0">
+            <a:schemeClr val="accent1"/>
+          </a:effectRef>
+          <a:fontRef idx="minor">
+            <a:schemeClr val="dk1"/>
+          </a:fontRef>
+        </p:style>
+        <p:txBody>
+          <a:bodyPr rtlCol="0" anchor="ctr"/>
+          <a:lstStyle/>
+          <a:p>
+            <a:r>
+              <a:rPr lang="en-US" sz="800" dirty="0" smtClean="0"/>
+              <a:t>ASSETS</a:t>
+            </a:r>
+            <a:endParaRPr lang="en-US" sz="800" dirty="0"/>
+          </a:p>
+        </p:txBody>
+      </p:sp>
+      <p:sp>
+        <p:nvSpPr>
+          <p:cNvPr id="228" name="Rectangle 227"/>
+          <p:cNvSpPr/>
+          <p:nvPr/>
+        </p:nvSpPr>
+        <p:spPr>
+          <a:xfrm>
+            <a:off x="2674231" y="1151516"/>
+            <a:ext cx="914400" cy="182880"/>
+          </a:xfrm>
+          <a:prstGeom prst="rect">
+            <a:avLst/>
+          </a:prstGeom>
+        </p:spPr>
+        <p:style>
+          <a:lnRef idx="2">
+            <a:schemeClr val="accent1"/>
+          </a:lnRef>
+          <a:fillRef idx="1">
+            <a:schemeClr val="lt1"/>
+          </a:fillRef>
+          <a:effectRef idx="0">
+            <a:schemeClr val="accent1"/>
+          </a:effectRef>
+          <a:fontRef idx="minor">
+            <a:schemeClr val="dk1"/>
+          </a:fontRef>
+        </p:style>
+        <p:txBody>
+          <a:bodyPr rtlCol="0" anchor="ctr"/>
+          <a:lstStyle/>
+          <a:p>
+            <a:r>
+              <a:rPr lang="en-US" sz="800" dirty="0" smtClean="0"/>
+              <a:t>ASSETS</a:t>
+            </a:r>
+            <a:endParaRPr lang="en-US" sz="800" dirty="0"/>
+          </a:p>
+        </p:txBody>
+      </p:sp>
+      <p:cxnSp>
+        <p:nvCxnSpPr>
+          <p:cNvPr id="235" name="Connecteur droit avec flèche 234"/>
+          <p:cNvCxnSpPr>
+            <a:stCxn id="212" idx="0"/>
+            <a:endCxn id="34" idx="3"/>
+          </p:cNvCxnSpPr>
+          <p:nvPr/>
+        </p:nvCxnSpPr>
+        <p:spPr>
+          <a:xfrm flipV="1">
+            <a:off x="1800226" y="2274545"/>
+            <a:ext cx="304799" cy="1930"/>
+          </a:xfrm>
+          <a:prstGeom prst="straightConnector1">
+            <a:avLst/>
+          </a:prstGeom>
+          <a:ln w="38100">
+            <a:solidFill>
+              <a:schemeClr val="tx1"/>
+            </a:solidFill>
+            <a:headEnd type="none" w="med" len="med"/>
+            <a:tailEnd type="triangle" w="med" len="med"/>
+          </a:ln>
+        </p:spPr>
+        <p:style>
+          <a:lnRef idx="3">
+            <a:schemeClr val="dk1"/>
+          </a:lnRef>
+          <a:fillRef idx="0">
+            <a:schemeClr val="dk1"/>
+          </a:fillRef>
+          <a:effectRef idx="2">
+            <a:schemeClr val="dk1"/>
+          </a:effectRef>
+          <a:fontRef idx="minor">
+            <a:schemeClr val="tx1"/>
+          </a:fontRef>
+        </p:style>
+      </p:cxnSp>
+      <p:cxnSp>
+        <p:nvCxnSpPr>
+          <p:cNvPr id="238" name="Connecteur droit avec flèche 237"/>
+          <p:cNvCxnSpPr>
+            <a:stCxn id="213" idx="0"/>
+            <a:endCxn id="32" idx="3"/>
+          </p:cNvCxnSpPr>
+          <p:nvPr/>
+        </p:nvCxnSpPr>
+        <p:spPr>
+          <a:xfrm flipV="1">
+            <a:off x="1981201" y="1055345"/>
+            <a:ext cx="419099" cy="144805"/>
+          </a:xfrm>
+          <a:prstGeom prst="straightConnector1">
+            <a:avLst/>
+          </a:prstGeom>
+          <a:ln w="38100">
+            <a:solidFill>
+              <a:schemeClr val="tx1"/>
+            </a:solidFill>
+            <a:headEnd type="none" w="med" len="med"/>
+            <a:tailEnd type="triangle" w="med" len="med"/>
+          </a:ln>
+        </p:spPr>
+        <p:style>
+          <a:lnRef idx="3">
+            <a:schemeClr val="dk1"/>
+          </a:lnRef>
+          <a:fillRef idx="0">
+            <a:schemeClr val="dk1"/>
+          </a:fillRef>
+          <a:effectRef idx="2">
+            <a:schemeClr val="dk1"/>
+          </a:effectRef>
+          <a:fontRef idx="minor">
+            <a:schemeClr val="tx1"/>
+          </a:fontRef>
+        </p:style>
+      </p:cxnSp>
+      <p:cxnSp>
+        <p:nvCxnSpPr>
+          <p:cNvPr id="241" name="Connecteur droit avec flèche 240"/>
+          <p:cNvCxnSpPr>
+            <a:stCxn id="210" idx="0"/>
+            <a:endCxn id="36" idx="3"/>
+          </p:cNvCxnSpPr>
+          <p:nvPr/>
+        </p:nvCxnSpPr>
+        <p:spPr>
+          <a:xfrm>
+            <a:off x="1800226" y="4733925"/>
+            <a:ext cx="180974" cy="26645"/>
+          </a:xfrm>
+          <a:prstGeom prst="straightConnector1">
+            <a:avLst/>
+          </a:prstGeom>
+          <a:ln w="38100">
+            <a:solidFill>
+              <a:schemeClr val="tx1"/>
+            </a:solidFill>
+            <a:headEnd type="none" w="med" len="med"/>
+            <a:tailEnd type="triangle" w="med" len="med"/>
+          </a:ln>
+        </p:spPr>
+        <p:style>
+          <a:lnRef idx="3">
+            <a:schemeClr val="dk1"/>
+          </a:lnRef>
+          <a:fillRef idx="0">
+            <a:schemeClr val="dk1"/>
+          </a:fillRef>
+          <a:effectRef idx="2">
+            <a:schemeClr val="dk1"/>
+          </a:effectRef>
+          <a:fontRef idx="minor">
+            <a:schemeClr val="tx1"/>
+          </a:fontRef>
+        </p:style>
+      </p:cxnSp>
+      <p:cxnSp>
+        <p:nvCxnSpPr>
+          <p:cNvPr id="245" name="Connecteur droit avec flèche 244"/>
+          <p:cNvCxnSpPr>
+            <a:stCxn id="9" idx="3"/>
+            <a:endCxn id="181" idx="1"/>
+          </p:cNvCxnSpPr>
+          <p:nvPr/>
+        </p:nvCxnSpPr>
+        <p:spPr>
+          <a:xfrm flipV="1">
+            <a:off x="3140956" y="5633981"/>
+            <a:ext cx="666750" cy="361950"/>
+          </a:xfrm>
+          <a:prstGeom prst="straightConnector1">
+            <a:avLst/>
+          </a:prstGeom>
+          <a:ln w="38100">
+            <a:solidFill>
+              <a:schemeClr val="tx1"/>
+            </a:solidFill>
+            <a:headEnd type="none" w="med" len="med"/>
+            <a:tailEnd type="triangle" w="med" len="med"/>
+          </a:ln>
+        </p:spPr>
+        <p:style>
+          <a:lnRef idx="3">
+            <a:schemeClr val="dk1"/>
+          </a:lnRef>
+          <a:fillRef idx="0">
+            <a:schemeClr val="dk1"/>
+          </a:fillRef>
+          <a:effectRef idx="2">
+            <a:schemeClr val="dk1"/>
+          </a:effectRef>
+          <a:fontRef idx="minor">
+            <a:schemeClr val="tx1"/>
+          </a:fontRef>
+        </p:style>
+      </p:cxnSp>
+      <p:cxnSp>
+        <p:nvCxnSpPr>
+          <p:cNvPr id="322" name="Connecteur droit avec flèche 321"/>
+          <p:cNvCxnSpPr>
+            <a:stCxn id="1032" idx="2"/>
+            <a:endCxn id="213" idx="3"/>
+          </p:cNvCxnSpPr>
+          <p:nvPr/>
+        </p:nvCxnSpPr>
+        <p:spPr>
+          <a:xfrm rot="5400000" flipH="1" flipV="1">
+            <a:off x="-183356" y="1769269"/>
+            <a:ext cx="1905000" cy="766762"/>
+          </a:xfrm>
+          <a:prstGeom prst="straightConnector1">
+            <a:avLst/>
+          </a:prstGeom>
+          <a:ln w="38100">
+            <a:solidFill>
+              <a:schemeClr val="tx1"/>
+            </a:solidFill>
+            <a:headEnd type="none" w="med" len="med"/>
+            <a:tailEnd type="triangle" w="med" len="med"/>
+          </a:ln>
+        </p:spPr>
+        <p:style>
+          <a:lnRef idx="3">
+            <a:schemeClr val="dk1"/>
+          </a:lnRef>
+          <a:fillRef idx="0">
+            <a:schemeClr val="dk1"/>
+          </a:fillRef>
+          <a:effectRef idx="2">
+            <a:schemeClr val="dk1"/>
+          </a:effectRef>
+          <a:fontRef idx="minor">
+            <a:schemeClr val="tx1"/>
+          </a:fontRef>
+        </p:style>
+      </p:cxnSp>
+      <p:cxnSp>
+        <p:nvCxnSpPr>
+          <p:cNvPr id="325" name="Connecteur droit avec flèche 324"/>
+          <p:cNvCxnSpPr>
+            <a:stCxn id="1032" idx="2"/>
+            <a:endCxn id="212" idx="3"/>
+          </p:cNvCxnSpPr>
+          <p:nvPr/>
+        </p:nvCxnSpPr>
+        <p:spPr>
+          <a:xfrm rot="5400000" flipH="1" flipV="1">
+            <a:off x="264318" y="2397919"/>
+            <a:ext cx="828675" cy="585787"/>
+          </a:xfrm>
+          <a:prstGeom prst="straightConnector1">
+            <a:avLst/>
+          </a:prstGeom>
+          <a:ln w="38100">
+            <a:solidFill>
+              <a:schemeClr val="tx1"/>
+            </a:solidFill>
+            <a:headEnd type="none" w="med" len="med"/>
+            <a:tailEnd type="triangle" w="med" len="med"/>
+          </a:ln>
+        </p:spPr>
+        <p:style>
+          <a:lnRef idx="3">
+            <a:schemeClr val="dk1"/>
+          </a:lnRef>
+          <a:fillRef idx="0">
+            <a:schemeClr val="dk1"/>
+          </a:fillRef>
+          <a:effectRef idx="2">
+            <a:schemeClr val="dk1"/>
+          </a:effectRef>
+          <a:fontRef idx="minor">
+            <a:schemeClr val="tx1"/>
+          </a:fontRef>
+        </p:style>
+      </p:cxnSp>
+      <p:cxnSp>
+        <p:nvCxnSpPr>
+          <p:cNvPr id="328" name="Connecteur droit avec flèche 327"/>
+          <p:cNvCxnSpPr>
+            <a:stCxn id="1032" idx="2"/>
+            <a:endCxn id="211" idx="3"/>
+          </p:cNvCxnSpPr>
+          <p:nvPr/>
+        </p:nvCxnSpPr>
+        <p:spPr>
+          <a:xfrm rot="16200000" flipH="1">
+            <a:off x="454819" y="3036093"/>
+            <a:ext cx="409575" cy="547687"/>
+          </a:xfrm>
+          <a:prstGeom prst="straightConnector1">
+            <a:avLst/>
+          </a:prstGeom>
+          <a:ln w="38100">
+            <a:solidFill>
+              <a:schemeClr val="tx1"/>
+            </a:solidFill>
+            <a:headEnd type="none" w="med" len="med"/>
+            <a:tailEnd type="triangle" w="med" len="med"/>
+          </a:ln>
+        </p:spPr>
+        <p:style>
+          <a:lnRef idx="3">
+            <a:schemeClr val="dk1"/>
+          </a:lnRef>
+          <a:fillRef idx="0">
+            <a:schemeClr val="dk1"/>
+          </a:fillRef>
+          <a:effectRef idx="2">
+            <a:schemeClr val="dk1"/>
+          </a:effectRef>
+          <a:fontRef idx="minor">
+            <a:schemeClr val="tx1"/>
+          </a:fontRef>
+        </p:style>
+      </p:cxnSp>
+      <p:cxnSp>
+        <p:nvCxnSpPr>
+          <p:cNvPr id="331" name="Connecteur droit avec flèche 330"/>
+          <p:cNvCxnSpPr>
+            <a:stCxn id="1032" idx="2"/>
+            <a:endCxn id="210" idx="3"/>
+          </p:cNvCxnSpPr>
+          <p:nvPr/>
+        </p:nvCxnSpPr>
+        <p:spPr>
+          <a:xfrm rot="16200000" flipH="1">
+            <a:off x="-135731" y="3626643"/>
+            <a:ext cx="1628775" cy="585787"/>
+          </a:xfrm>
+          <a:prstGeom prst="straightConnector1">
+            <a:avLst/>
+          </a:prstGeom>
+          <a:ln w="38100">
+            <a:solidFill>
+              <a:schemeClr val="tx1"/>
+            </a:solidFill>
+            <a:headEnd type="none" w="med" len="med"/>
+            <a:tailEnd type="triangle" w="med" len="med"/>
+          </a:ln>
+        </p:spPr>
+        <p:style>
+          <a:lnRef idx="3">
+            <a:schemeClr val="dk1"/>
+          </a:lnRef>
+          <a:fillRef idx="0">
+            <a:schemeClr val="dk1"/>
+          </a:fillRef>
+          <a:effectRef idx="2">
+            <a:schemeClr val="dk1"/>
+          </a:effectRef>
+          <a:fontRef idx="minor">
+            <a:schemeClr val="tx1"/>
+          </a:fontRef>
+        </p:style>
+      </p:cxnSp>
+      <p:cxnSp>
+        <p:nvCxnSpPr>
+          <p:cNvPr id="334" name="Connecteur droit avec flèche 333"/>
+          <p:cNvCxnSpPr>
+            <a:stCxn id="1032" idx="2"/>
+            <a:endCxn id="257" idx="3"/>
+          </p:cNvCxnSpPr>
+          <p:nvPr/>
+        </p:nvCxnSpPr>
+        <p:spPr>
+          <a:xfrm rot="16200000" flipH="1">
+            <a:off x="-259531" y="3750444"/>
+            <a:ext cx="2914600" cy="1624012"/>
+          </a:xfrm>
+          <a:prstGeom prst="straightConnector1">
+            <a:avLst/>
+          </a:prstGeom>
+          <a:ln w="38100">
+            <a:solidFill>
+              <a:schemeClr val="tx1"/>
+            </a:solidFill>
+            <a:headEnd type="none" w="med" len="med"/>
+            <a:tailEnd type="triangle" w="med" len="med"/>
+          </a:ln>
+        </p:spPr>
+        <p:style>
+          <a:lnRef idx="3">
+            <a:schemeClr val="dk1"/>
+          </a:lnRef>
+          <a:fillRef idx="0">
+            <a:schemeClr val="dk1"/>
+          </a:fillRef>
+          <a:effectRef idx="2">
+            <a:schemeClr val="dk1"/>
+          </a:effectRef>
+          <a:fontRef idx="minor">
+            <a:schemeClr val="tx1"/>
+          </a:fontRef>
+        </p:style>
+      </p:cxnSp>
+      <p:pic>
+        <p:nvPicPr>
+          <p:cNvPr id="1032" name="Picture 8" descr="User - Avatar &amp; Emoticons Icons"/>
+          <p:cNvPicPr>
+            <a:picLocks noChangeAspect="1" noChangeArrowheads="1"/>
+          </p:cNvPicPr>
+          <p:nvPr/>
+        </p:nvPicPr>
+        <p:blipFill>
+          <a:blip r:embed="rId9" cstate="print"/>
+          <a:srcRect/>
+          <a:stretch>
+            <a:fillRect/>
+          </a:stretch>
+        </p:blipFill>
+        <p:spPr bwMode="auto">
+          <a:xfrm>
+            <a:off x="0" y="2333625"/>
+            <a:ext cx="771525" cy="771525"/>
+          </a:xfrm>
+          <a:prstGeom prst="rect">
+            <a:avLst/>
+          </a:prstGeom>
+          <a:noFill/>
+        </p:spPr>
+      </p:pic>
+      <p:pic>
+        <p:nvPicPr>
+          <p:cNvPr id="1033" name="Picture 9"/>
+          <p:cNvPicPr>
+            <a:picLocks noChangeAspect="1" noChangeArrowheads="1"/>
+          </p:cNvPicPr>
+          <p:nvPr/>
+        </p:nvPicPr>
+        <p:blipFill>
+          <a:blip r:embed="rId10" cstate="print"/>
+          <a:srcRect/>
+          <a:stretch>
+            <a:fillRect/>
+          </a:stretch>
+        </p:blipFill>
+        <p:spPr bwMode="auto">
+          <a:xfrm>
+            <a:off x="10972800" y="3943350"/>
+            <a:ext cx="390525" cy="381749"/>
+          </a:xfrm>
+          <a:prstGeom prst="rect">
+            <a:avLst/>
+          </a:prstGeom>
+          <a:noFill/>
+          <a:ln w="9525">
+            <a:noFill/>
+            <a:miter lim="800000"/>
+            <a:headEnd/>
+            <a:tailEnd/>
+          </a:ln>
+          <a:effectLst/>
+        </p:spPr>
+      </p:pic>
+      <p:sp>
+        <p:nvSpPr>
+          <p:cNvPr id="115" name="Rectangle 114"/>
+          <p:cNvSpPr/>
+          <p:nvPr/>
+        </p:nvSpPr>
+        <p:spPr>
+          <a:xfrm>
+            <a:off x="4719923" y="6259294"/>
+            <a:ext cx="4768420" cy="584775"/>
+          </a:xfrm>
+          <a:prstGeom prst="rect">
+            <a:avLst/>
+          </a:prstGeom>
+        </p:spPr>
+        <p:txBody>
+          <a:bodyPr wrap="none">
+            <a:spAutoFit/>
+          </a:bodyPr>
+          <a:lstStyle/>
+          <a:p>
+            <a:pPr algn="r"/>
+            <a:r>
+              <a:rPr lang="en-US" sz="3200" b="1" dirty="0" smtClean="0">
+                <a:ln w="3175" cmpd="sng">
+                  <a:solidFill>
+                    <a:schemeClr val="tx1"/>
+                  </a:solidFill>
+                  <a:prstDash val="solid"/>
+                  <a:miter lim="800000"/>
+                </a:ln>
+                <a:latin typeface="Arial" pitchFamily="34" charset="0"/>
+                <a:cs typeface="Arial" pitchFamily="34" charset="0"/>
+              </a:rPr>
+              <a:t>Hexagonal Architecture</a:t>
+            </a:r>
+            <a:endParaRPr lang="en-US" sz="3200" b="1" dirty="0">
+              <a:ln w="3175" cmpd="sng">
+                <a:solidFill>
+                  <a:schemeClr val="tx1"/>
+                </a:solidFill>
+                <a:prstDash val="solid"/>
+                <a:miter lim="800000"/>
+              </a:ln>
+              <a:latin typeface="Arial" pitchFamily="34" charset="0"/>
+              <a:cs typeface="Arial" pitchFamily="34" charset="0"/>
+            </a:endParaRPr>
+          </a:p>
+        </p:txBody>
+      </p:sp>
+    </p:spTree>
+  </p:cSld>
+  <p:clrMapOvr>
+    <a:masterClrMapping/>
+  </p:clrMapOvr>
+</p:sld>
+</file>
+
+<file path=ppt/slides/slide2.xml><?xml version="1.0" encoding="utf-8"?>
+<p:sld xmlns:a="http://schemas.openxmlformats.org/drawingml/2006/main" xmlns:r="http://schemas.openxmlformats.org/officeDocument/2006/relationships" xmlns:p="http://schemas.openxmlformats.org/presentationml/2006/main">
+  <p:cSld>
+    <p:spTree>
+      <p:nvGrpSpPr>
+        <p:cNvPr id="1" name=""/>
+        <p:cNvGrpSpPr/>
+        <p:nvPr/>
+      </p:nvGrpSpPr>
+      <p:grpSpPr>
+        <a:xfrm>
+          <a:off x="0" y="0"/>
+          <a:ext cx="0" cy="0"/>
+          <a:chOff x="0" y="0"/>
+          <a:chExt cx="0" cy="0"/>
+        </a:xfrm>
+      </p:grpSpPr>
       <p:cxnSp>
         <p:nvCxnSpPr>
           <p:cNvPr id="119" name="Straight Connector 28"/>
@@ -3471,14 +7996,10 @@
             <a:pPr algn="ctr"/>
             <a:r>
               <a:rPr lang="en-US" sz="1400" dirty="0" smtClean="0"/>
-              <a:t>My_game</a:t>
-            </a:r>
-            <a:r>
-              <a:rPr lang="en-US" sz="1400" dirty="0"/>
-              <a:t/>
+              <a:t>MYGAME_</a:t>
             </a:r>
             <a:br>
-              <a:rPr lang="en-US" sz="1400" dirty="0"/>
+              <a:rPr lang="en-US" sz="1400" dirty="0" smtClean="0"/>
             </a:br>
             <a:r>
               <a:rPr lang="en-US" sz="1400" dirty="0" smtClean="0"/>
@@ -3634,7 +8155,7 @@
           <a:prstGeom prst="line">
             <a:avLst/>
           </a:prstGeom>
-          <a:ln w="28575">
+          <a:ln w="76200">
             <a:headEnd type="triangle" w="med" len="med"/>
             <a:tailEnd type="none" w="med" len="med"/>
           </a:ln>
@@ -4155,7 +8676,7 @@
           <a:prstGeom prst="line">
             <a:avLst/>
           </a:prstGeom>
-          <a:ln w="28575">
+          <a:ln w="76200">
             <a:headEnd type="triangle" w="med" len="med"/>
             <a:tailEnd type="none" w="med" len="med"/>
           </a:ln>
@@ -4192,7 +8713,7 @@
           <a:prstGeom prst="line">
             <a:avLst/>
           </a:prstGeom>
-          <a:ln w="28575">
+          <a:ln w="76200">
             <a:headEnd type="triangle" w="med" len="med"/>
             <a:tailEnd type="none" w="med" len="med"/>
           </a:ln>
@@ -4229,7 +8750,7 @@
           <a:prstGeom prst="line">
             <a:avLst/>
           </a:prstGeom>
-          <a:ln w="28575">
+          <a:ln w="76200">
             <a:headEnd type="triangle" w="med" len="med"/>
             <a:tailEnd type="none" w="med" len="med"/>
           </a:ln>
@@ -4266,7 +8787,7 @@
           <a:prstGeom prst="line">
             <a:avLst/>
           </a:prstGeom>
-          <a:ln w="28575">
+          <a:ln w="76200">
             <a:headEnd type="triangle" w="med" len="med"/>
             <a:tailEnd type="none" w="med" len="med"/>
           </a:ln>
@@ -4303,7 +8824,7 @@
           <a:prstGeom prst="line">
             <a:avLst/>
           </a:prstGeom>
-          <a:ln w="28575">
+          <a:ln w="76200">
             <a:headEnd type="triangle" w="med" len="med"/>
             <a:tailEnd type="none" w="med" len="med"/>
           </a:ln>
@@ -5459,7 +9980,7 @@
     </p:spTree>
     <p:extLst>
       <p:ext uri="{BB962C8B-B14F-4D97-AF65-F5344CB8AC3E}">
-        <p14:creationId xmlns="" xmlns:p14="http://schemas.microsoft.com/office/powerpoint/2010/main" val="521620976"/>
+        <p14:creationId xmlns:p14="http://schemas.microsoft.com/office/powerpoint/2010/main" xmlns="" val="521620976"/>
       </p:ext>
     </p:extLst>
   </p:cSld>
@@ -5731,7 +10252,7 @@
   <a:extraClrSchemeLst/>
   <a:extLst>
     <a:ext uri="{05A4C25C-085E-4340-85A3-A5531E510DB2}">
-      <thm15:themeFamily xmlns="" xmlns:thm15="http://schemas.microsoft.com/office/thememl/2012/main" name="Office Theme" id="{62F939B6-93AF-4DB8-9C6B-D6C7DFDC589F}" vid="{4A3C46E8-61CC-4603-A589-7422A47A8E4A}"/>
+      <thm15:themeFamily xmlns:thm15="http://schemas.microsoft.com/office/thememl/2012/main" xmlns="" name="Office Theme" id="{62F939B6-93AF-4DB8-9C6B-D6C7DFDC589F}" vid="{4A3C46E8-61CC-4603-A589-7422A47A8E4A}"/>
     </a:ext>
   </a:extLst>
 </a:theme>

</xml_diff>